<commit_message>
Update advanced data structures
</commit_message>
<xml_diff>
--- a/Section05/5.3-Python_DataTypes2_AdvancedTypes.pptx
+++ b/Section05/5.3-Python_DataTypes2_AdvancedTypes.pptx
@@ -9,8 +9,8 @@
     <p:notesMasterId r:id="rId19"/>
   </p:notesMasterIdLst>
   <p:sldIdLst>
-    <p:sldId id="284" r:id="rId3"/>
-    <p:sldId id="256" r:id="rId4"/>
+    <p:sldId id="256" r:id="rId3"/>
+    <p:sldId id="284" r:id="rId4"/>
     <p:sldId id="285" r:id="rId5"/>
     <p:sldId id="286" r:id="rId6"/>
     <p:sldId id="287" r:id="rId7"/>
@@ -285,7 +285,7 @@
       <p15:sldGuideLst xmlns:p15="http://schemas.microsoft.com/office/powerpoint/2012/main"/>
     </p:ext>
     <p:ext uri="http://customooxmlschemas.google.com/">
-      <go:slidesCustomData xmlns="" xmlns:mc="http://schemas.openxmlformats.org/markup-compatibility/2006" xmlns:mv="urn:schemas-microsoft-com:mac:vml" xmlns:c="http://schemas.openxmlformats.org/drawingml/2006/chart" xmlns:dgm="http://schemas.openxmlformats.org/drawingml/2006/diagram" xmlns:o="urn:schemas-microsoft-com:office:office" xmlns:v="urn:schemas-microsoft-com:vml" xmlns:pvml="urn:schemas-microsoft-com:office:powerpoint" xmlns:com="http://schemas.openxmlformats.org/drawingml/2006/compatibility" xmlns:p14="http://schemas.microsoft.com/office/powerpoint/2010/main" xmlns:p15="http://schemas.microsoft.com/office/powerpoint/2012/main" xmlns:ahyp="http://schemas.microsoft.com/office/drawing/2018/hyperlinkcolor" xmlns:go="http://customooxmlschemas.google.com/" r:id="rId86" roundtripDataSignature="AMtx7mgaKZtO0drwPbXTu692r2s2N2s7Kw=="/>
+      <go:slidesCustomData xmlns:go="http://customooxmlschemas.google.com/" xmlns:ahyp="http://schemas.microsoft.com/office/drawing/2018/hyperlinkcolor" xmlns:p15="http://schemas.microsoft.com/office/powerpoint/2012/main" xmlns:p14="http://schemas.microsoft.com/office/powerpoint/2010/main" xmlns:com="http://schemas.openxmlformats.org/drawingml/2006/compatibility" xmlns:pvml="urn:schemas-microsoft-com:office:powerpoint" xmlns:v="urn:schemas-microsoft-com:vml" xmlns:o="urn:schemas-microsoft-com:office:office" xmlns:dgm="http://schemas.openxmlformats.org/drawingml/2006/diagram" xmlns:c="http://schemas.openxmlformats.org/drawingml/2006/chart" xmlns:mv="urn:schemas-microsoft-com:mac:vml" xmlns:mc="http://schemas.openxmlformats.org/markup-compatibility/2006" xmlns="" r:id="rId86" roundtripDataSignature="AMtx7mgaKZtO0drwPbXTu692r2s2N2s7Kw=="/>
     </p:ext>
   </p:extLst>
 </p:presentation>
@@ -737,7 +737,7 @@
   <p:cSld>
     <p:spTree>
       <p:nvGrpSpPr>
-        <p:cNvPr id="1" name="Shape 294"/>
+        <p:cNvPr id="1" name="Shape 95"/>
         <p:cNvGrpSpPr/>
         <p:nvPr/>
       </p:nvGrpSpPr>
@@ -751,7 +751,7 @@
       </p:grpSpPr>
       <p:sp>
         <p:nvSpPr>
-          <p:cNvPr id="295" name="Google Shape;295;p30:notes"/>
+          <p:cNvPr id="96" name="Google Shape;96;p1:notes"/>
           <p:cNvSpPr txBox="1">
             <a:spLocks noGrp="1"/>
           </p:cNvSpPr>
@@ -789,7 +789,7 @@
       </p:sp>
       <p:sp>
         <p:nvSpPr>
-          <p:cNvPr id="296" name="Google Shape;296;p30:notes"/>
+          <p:cNvPr id="97" name="Google Shape;97;p1:notes"/>
           <p:cNvSpPr>
             <a:spLocks noGrp="1" noRot="1" noChangeAspect="1"/>
           </p:cNvSpPr>
@@ -1569,7 +1569,7 @@
   <p:cSld>
     <p:spTree>
       <p:nvGrpSpPr>
-        <p:cNvPr id="1" name="Shape 95"/>
+        <p:cNvPr id="1" name="Shape 294"/>
         <p:cNvGrpSpPr/>
         <p:nvPr/>
       </p:nvGrpSpPr>
@@ -1583,7 +1583,7 @@
       </p:grpSpPr>
       <p:sp>
         <p:nvSpPr>
-          <p:cNvPr id="96" name="Google Shape;96;p1:notes"/>
+          <p:cNvPr id="295" name="Google Shape;295;p30:notes"/>
           <p:cNvSpPr txBox="1">
             <a:spLocks noGrp="1"/>
           </p:cNvSpPr>
@@ -1621,7 +1621,7 @@
       </p:sp>
       <p:sp>
         <p:nvSpPr>
-          <p:cNvPr id="97" name="Google Shape;97;p1:notes"/>
+          <p:cNvPr id="296" name="Google Shape;296;p30:notes"/>
           <p:cNvSpPr>
             <a:spLocks noGrp="1" noRot="1" noChangeAspect="1"/>
           </p:cNvSpPr>
@@ -20929,9 +20929,17 @@
 <file path=ppt/slides/slide1.xml><?xml version="1.0" encoding="utf-8"?>
 <p:sld xmlns:a="http://schemas.openxmlformats.org/drawingml/2006/main" xmlns:r="http://schemas.openxmlformats.org/officeDocument/2006/relationships" xmlns:p="http://schemas.openxmlformats.org/presentationml/2006/main">
   <p:cSld>
+    <p:bg>
+      <p:bgPr>
+        <a:solidFill>
+          <a:schemeClr val="lt2"/>
+        </a:solidFill>
+        <a:effectLst/>
+      </p:bgPr>
+    </p:bg>
     <p:spTree>
       <p:nvGrpSpPr>
-        <p:cNvPr id="1" name="Shape 297"/>
+        <p:cNvPr id="1" name="Shape 98"/>
         <p:cNvGrpSpPr/>
         <p:nvPr/>
       </p:nvGrpSpPr>
@@ -20945,18 +20953,264 @@
       </p:grpSpPr>
       <p:sp>
         <p:nvSpPr>
-          <p:cNvPr id="298" name="Google Shape;298;p30"/>
+          <p:cNvPr id="99" name="Google Shape;99;p1"/>
+          <p:cNvSpPr/>
+          <p:nvPr/>
+        </p:nvSpPr>
+        <p:spPr>
+          <a:xfrm>
+            <a:off x="0" y="0"/>
+            <a:ext cx="12192000" cy="6858000"/>
+          </a:xfrm>
+          <a:prstGeom prst="rect">
+            <a:avLst/>
+          </a:prstGeom>
+          <a:solidFill>
+            <a:schemeClr val="lt2"/>
+          </a:solidFill>
+          <a:ln>
+            <a:noFill/>
+          </a:ln>
+        </p:spPr>
+        <p:txBody>
+          <a:bodyPr spcFirstLastPara="1" wrap="square" lIns="91425" tIns="45700" rIns="91425" bIns="45700" anchor="ctr" anchorCtr="0">
+            <a:noAutofit/>
+          </a:bodyPr>
+          <a:lstStyle/>
+          <a:p>
+            <a:pPr marL="0" marR="0" lvl="0" indent="0" algn="ctr" defTabSz="914400" rtl="0" eaLnBrk="1" fontAlgn="auto" latinLnBrk="0" hangingPunct="1">
+              <a:lnSpc>
+                <a:spcPct val="100000"/>
+              </a:lnSpc>
+              <a:spcBef>
+                <a:spcPts val="0"/>
+              </a:spcBef>
+              <a:spcAft>
+                <a:spcPts val="0"/>
+              </a:spcAft>
+              <a:buClr>
+                <a:srgbClr val="000000"/>
+              </a:buClr>
+              <a:buSzTx/>
+              <a:buFont typeface="Arial"/>
+              <a:buNone/>
+              <a:tabLst/>
+              <a:defRPr/>
+            </a:pPr>
+            <a:endParaRPr kumimoji="0" sz="1800" b="0" i="0" u="none" strike="noStrike" kern="0" cap="none" spc="0" normalizeH="0" baseline="0" noProof="0">
+              <a:ln>
+                <a:noFill/>
+              </a:ln>
+              <a:solidFill>
+                <a:srgbClr val="FFFFFF"/>
+              </a:solidFill>
+              <a:effectLst/>
+              <a:uLnTx/>
+              <a:uFillTx/>
+              <a:latin typeface="Sorts Mill Goudy"/>
+              <a:ea typeface="Sorts Mill Goudy"/>
+              <a:cs typeface="Sorts Mill Goudy"/>
+              <a:sym typeface="Sorts Mill Goudy"/>
+            </a:endParaRPr>
+          </a:p>
+        </p:txBody>
+      </p:sp>
+      <p:pic>
+        <p:nvPicPr>
+          <p:cNvPr id="100" name="Google Shape;100;p1" descr="Computer script on a screen"/>
+          <p:cNvPicPr preferRelativeResize="0"/>
+          <p:nvPr/>
+        </p:nvPicPr>
+        <p:blipFill rotWithShape="1">
+          <a:blip r:embed="rId3">
+            <a:alphaModFix/>
+          </a:blip>
+          <a:srcRect t="5981" b="9749"/>
+          <a:stretch/>
+        </p:blipFill>
+        <p:spPr>
+          <a:xfrm>
+            <a:off x="20" y="10"/>
+            <a:ext cx="12191979" cy="6857989"/>
+          </a:xfrm>
+          <a:prstGeom prst="rect">
+            <a:avLst/>
+          </a:prstGeom>
+          <a:noFill/>
+          <a:ln>
+            <a:noFill/>
+          </a:ln>
+        </p:spPr>
+      </p:pic>
+      <p:sp>
+        <p:nvSpPr>
+          <p:cNvPr id="101" name="Google Shape;101;p1"/>
+          <p:cNvSpPr/>
+          <p:nvPr/>
+        </p:nvSpPr>
+        <p:spPr>
+          <a:xfrm>
+            <a:off x="1109595" y="805231"/>
+            <a:ext cx="3876811" cy="5245563"/>
+          </a:xfrm>
+          <a:custGeom>
+            <a:avLst/>
+            <a:gdLst/>
+            <a:ahLst/>
+            <a:cxnLst/>
+            <a:rect l="l" t="t" r="r" b="b"/>
+            <a:pathLst>
+              <a:path w="3876811" h="5245563" extrusionOk="0">
+                <a:moveTo>
+                  <a:pt x="1941583" y="0"/>
+                </a:moveTo>
+                <a:lnTo>
+                  <a:pt x="2111641" y="149097"/>
+                </a:lnTo>
+                <a:cubicBezTo>
+                  <a:pt x="2533315" y="474958"/>
+                  <a:pt x="3008487" y="564716"/>
+                  <a:pt x="3370493" y="774451"/>
+                </a:cubicBezTo>
+                <a:cubicBezTo>
+                  <a:pt x="3718590" y="1017851"/>
+                  <a:pt x="3876811" y="1296993"/>
+                  <a:pt x="3876811" y="1854684"/>
+                </a:cubicBezTo>
+                <a:lnTo>
+                  <a:pt x="3876811" y="2019920"/>
+                </a:lnTo>
+                <a:lnTo>
+                  <a:pt x="3876811" y="2491569"/>
+                </a:lnTo>
+                <a:lnTo>
+                  <a:pt x="3876811" y="2753995"/>
+                </a:lnTo>
+                <a:lnTo>
+                  <a:pt x="3876811" y="3115353"/>
+                </a:lnTo>
+                <a:lnTo>
+                  <a:pt x="3876811" y="3390879"/>
+                </a:lnTo>
+                <a:cubicBezTo>
+                  <a:pt x="3876811" y="3948571"/>
+                  <a:pt x="3718588" y="4227713"/>
+                  <a:pt x="3370493" y="4471114"/>
+                </a:cubicBezTo>
+                <a:cubicBezTo>
+                  <a:pt x="3008484" y="4680847"/>
+                  <a:pt x="2533312" y="4770605"/>
+                  <a:pt x="2111639" y="5096465"/>
+                </a:cubicBezTo>
+                <a:lnTo>
+                  <a:pt x="1935228" y="5245563"/>
+                </a:lnTo>
+                <a:lnTo>
+                  <a:pt x="1765171" y="5096465"/>
+                </a:lnTo>
+                <a:cubicBezTo>
+                  <a:pt x="1343496" y="4770605"/>
+                  <a:pt x="868325" y="4680847"/>
+                  <a:pt x="506317" y="4471114"/>
+                </a:cubicBezTo>
+                <a:cubicBezTo>
+                  <a:pt x="158223" y="4227713"/>
+                  <a:pt x="0" y="3948571"/>
+                  <a:pt x="0" y="3390879"/>
+                </a:cubicBezTo>
+                <a:lnTo>
+                  <a:pt x="0" y="3115353"/>
+                </a:lnTo>
+                <a:lnTo>
+                  <a:pt x="0" y="2753995"/>
+                </a:lnTo>
+                <a:lnTo>
+                  <a:pt x="0" y="2491569"/>
+                </a:lnTo>
+                <a:lnTo>
+                  <a:pt x="0" y="2019920"/>
+                </a:lnTo>
+                <a:lnTo>
+                  <a:pt x="0" y="1854684"/>
+                </a:lnTo>
+                <a:cubicBezTo>
+                  <a:pt x="0" y="1296993"/>
+                  <a:pt x="158224" y="1017851"/>
+                  <a:pt x="506318" y="774451"/>
+                </a:cubicBezTo>
+                <a:cubicBezTo>
+                  <a:pt x="868327" y="564716"/>
+                  <a:pt x="1343498" y="474958"/>
+                  <a:pt x="1765173" y="149097"/>
+                </a:cubicBezTo>
+                <a:close/>
+              </a:path>
+            </a:pathLst>
+          </a:custGeom>
+          <a:solidFill>
+            <a:schemeClr val="lt2"/>
+          </a:solidFill>
+          <a:ln>
+            <a:noFill/>
+          </a:ln>
+        </p:spPr>
+        <p:txBody>
+          <a:bodyPr spcFirstLastPara="1" wrap="square" lIns="91425" tIns="45700" rIns="91425" bIns="45700" anchor="ctr" anchorCtr="0">
+            <a:noAutofit/>
+          </a:bodyPr>
+          <a:lstStyle/>
+          <a:p>
+            <a:pPr marL="0" marR="0" lvl="0" indent="0" algn="ctr" defTabSz="914400" rtl="0" eaLnBrk="1" fontAlgn="auto" latinLnBrk="0" hangingPunct="1">
+              <a:lnSpc>
+                <a:spcPct val="100000"/>
+              </a:lnSpc>
+              <a:spcBef>
+                <a:spcPts val="0"/>
+              </a:spcBef>
+              <a:spcAft>
+                <a:spcPts val="0"/>
+              </a:spcAft>
+              <a:buClr>
+                <a:srgbClr val="000000"/>
+              </a:buClr>
+              <a:buSzTx/>
+              <a:buFont typeface="Arial"/>
+              <a:buNone/>
+              <a:tabLst/>
+              <a:defRPr/>
+            </a:pPr>
+            <a:endParaRPr kumimoji="0" sz="1800" b="0" i="0" u="none" strike="noStrike" kern="0" cap="none" spc="0" normalizeH="0" baseline="0" noProof="0">
+              <a:ln>
+                <a:noFill/>
+              </a:ln>
+              <a:solidFill>
+                <a:srgbClr val="FFFFFF"/>
+              </a:solidFill>
+              <a:effectLst/>
+              <a:uLnTx/>
+              <a:uFillTx/>
+              <a:latin typeface="Sorts Mill Goudy"/>
+              <a:ea typeface="Sorts Mill Goudy"/>
+              <a:cs typeface="Sorts Mill Goudy"/>
+              <a:sym typeface="Sorts Mill Goudy"/>
+            </a:endParaRPr>
+          </a:p>
+        </p:txBody>
+      </p:sp>
+      <p:sp>
+        <p:nvSpPr>
+          <p:cNvPr id="102" name="Google Shape;102;p1"/>
           <p:cNvSpPr txBox="1">
             <a:spLocks noGrp="1"/>
           </p:cNvSpPr>
           <p:nvPr>
-            <p:ph type="title"/>
+            <p:ph type="ctrTitle"/>
           </p:nvPr>
         </p:nvSpPr>
         <p:spPr>
           <a:xfrm>
-            <a:off x="838200" y="365125"/>
-            <a:ext cx="10515600" cy="1325563"/>
+            <a:off x="1371600" y="1828800"/>
+            <a:ext cx="3356517" cy="1600200"/>
           </a:xfrm>
           <a:prstGeom prst="rect">
             <a:avLst/>
@@ -20967,14 +21221,14 @@
           </a:ln>
         </p:spPr>
         <p:txBody>
-          <a:bodyPr spcFirstLastPara="1" wrap="square" lIns="91425" tIns="45700" rIns="91425" bIns="45700" anchor="ctr" anchorCtr="0">
-            <a:normAutofit/>
+          <a:bodyPr spcFirstLastPara="1" wrap="square" lIns="91425" tIns="45700" rIns="91425" bIns="45700" anchor="b" anchorCtr="0">
+            <a:noAutofit/>
           </a:bodyPr>
           <a:lstStyle/>
           <a:p>
             <a:pPr marL="0" lvl="0" indent="0" algn="ctr" rtl="0">
               <a:lnSpc>
-                <a:spcPct val="90000"/>
+                <a:spcPct val="100000"/>
               </a:lnSpc>
               <a:spcBef>
                 <a:spcPts val="0"/>
@@ -20983,34 +21237,41 @@
                 <a:spcPts val="0"/>
               </a:spcAft>
               <a:buClr>
-                <a:schemeClr val="dk1"/>
+                <a:schemeClr val="dk2"/>
               </a:buClr>
-              <a:buSzPts val="8800"/>
-              <a:buFont typeface="Calibri"/>
+              <a:buSzPts val="4000"/>
+              <a:buFont typeface="Sorts Mill Goudy"/>
               <a:buNone/>
             </a:pPr>
             <a:r>
-              <a:rPr lang="en-US" sz="8800" b="1"/>
-              <a:t>Lists</a:t>
+              <a:rPr lang="en-US" sz="4000" b="1" dirty="0"/>
+              <a:t>Data Analytics </a:t>
             </a:r>
-            <a:endParaRPr/>
+            <a:br>
+              <a:rPr lang="en-US" sz="4000" b="1" dirty="0"/>
+            </a:br>
+            <a:r>
+              <a:rPr lang="en-US" sz="4000" b="1" dirty="0"/>
+              <a:t>+ Python</a:t>
+            </a:r>
+            <a:endParaRPr b="1" dirty="0"/>
           </a:p>
         </p:txBody>
       </p:sp>
       <p:sp>
         <p:nvSpPr>
-          <p:cNvPr id="299" name="Google Shape;299;p30"/>
+          <p:cNvPr id="103" name="Google Shape;103;p1"/>
           <p:cNvSpPr txBox="1">
             <a:spLocks noGrp="1"/>
           </p:cNvSpPr>
           <p:nvPr>
-            <p:ph type="body" idx="1"/>
+            <p:ph type="subTitle" idx="1"/>
           </p:nvPr>
         </p:nvSpPr>
         <p:spPr>
           <a:xfrm>
-            <a:off x="265043" y="1825625"/>
-            <a:ext cx="11728174" cy="4351338"/>
+            <a:off x="1594514" y="3813717"/>
+            <a:ext cx="2906973" cy="1331489"/>
           </a:xfrm>
           <a:prstGeom prst="rect">
             <a:avLst/>
@@ -21022,13 +21283,183 @@
         </p:spPr>
         <p:txBody>
           <a:bodyPr spcFirstLastPara="1" wrap="square" lIns="91425" tIns="45700" rIns="91425" bIns="45700" anchor="t" anchorCtr="0">
-            <a:normAutofit/>
+            <a:normAutofit fontScale="92500" lnSpcReduction="10000"/>
           </a:bodyPr>
           <a:lstStyle/>
           <a:p>
             <a:pPr marL="0" lvl="0" indent="0" algn="ctr" rtl="0">
               <a:lnSpc>
-                <a:spcPct val="90000"/>
+                <a:spcPct val="110000"/>
+              </a:lnSpc>
+              <a:spcBef>
+                <a:spcPts val="0"/>
+              </a:spcBef>
+              <a:spcAft>
+                <a:spcPts val="0"/>
+              </a:spcAft>
+              <a:buClr>
+                <a:schemeClr val="dk2"/>
+              </a:buClr>
+              <a:buSzPts val="3000"/>
+              <a:buNone/>
+            </a:pPr>
+            <a:r>
+              <a:rPr lang="en-US" sz="2800" b="1" dirty="0">
+                <a:solidFill>
+                  <a:schemeClr val="accent6">
+                    <a:lumMod val="50000"/>
+                  </a:schemeClr>
+                </a:solidFill>
+              </a:rPr>
+              <a:t>Advanced / compound</a:t>
+            </a:r>
+            <a:br>
+              <a:rPr lang="en-US" sz="2800" b="1" dirty="0">
+                <a:solidFill>
+                  <a:schemeClr val="accent6">
+                    <a:lumMod val="50000"/>
+                  </a:schemeClr>
+                </a:solidFill>
+              </a:rPr>
+            </a:br>
+            <a:r>
+              <a:rPr lang="en-US" sz="2800" b="1" dirty="0">
+                <a:solidFill>
+                  <a:schemeClr val="accent6">
+                    <a:lumMod val="50000"/>
+                  </a:schemeClr>
+                </a:solidFill>
+              </a:rPr>
+              <a:t>Data Types</a:t>
+            </a:r>
+          </a:p>
+        </p:txBody>
+      </p:sp>
+      <p:sp>
+        <p:nvSpPr>
+          <p:cNvPr id="104" name="Google Shape;104;p1"/>
+          <p:cNvSpPr/>
+          <p:nvPr/>
+        </p:nvSpPr>
+        <p:spPr>
+          <a:xfrm>
+            <a:off x="1040828" y="720724"/>
+            <a:ext cx="4014345" cy="5414576"/>
+          </a:xfrm>
+          <a:custGeom>
+            <a:avLst/>
+            <a:gdLst/>
+            <a:ahLst/>
+            <a:cxnLst/>
+            <a:rect l="l" t="t" r="r" b="b"/>
+            <a:pathLst>
+              <a:path w="4282900" h="5795027" extrusionOk="0">
+                <a:moveTo>
+                  <a:pt x="2144960" y="0"/>
+                </a:moveTo>
+                <a:lnTo>
+                  <a:pt x="2332832" y="164715"/>
+                </a:lnTo>
+                <a:cubicBezTo>
+                  <a:pt x="2798675" y="524709"/>
+                  <a:pt x="3323620" y="623869"/>
+                  <a:pt x="3723546" y="855573"/>
+                </a:cubicBezTo>
+                <a:cubicBezTo>
+                  <a:pt x="4108105" y="1124469"/>
+                  <a:pt x="4282900" y="1432851"/>
+                  <a:pt x="4282900" y="2048959"/>
+                </a:cubicBezTo>
+                <a:lnTo>
+                  <a:pt x="4282900" y="2231503"/>
+                </a:lnTo>
+                <a:lnTo>
+                  <a:pt x="4282900" y="2752557"/>
+                </a:lnTo>
+                <a:lnTo>
+                  <a:pt x="4282900" y="3042471"/>
+                </a:lnTo>
+                <a:lnTo>
+                  <a:pt x="4282900" y="3441681"/>
+                </a:lnTo>
+                <a:lnTo>
+                  <a:pt x="4282900" y="3746068"/>
+                </a:lnTo>
+                <a:cubicBezTo>
+                  <a:pt x="4282900" y="4362177"/>
+                  <a:pt x="4108103" y="4670559"/>
+                  <a:pt x="3723546" y="4939455"/>
+                </a:cubicBezTo>
+                <a:cubicBezTo>
+                  <a:pt x="3323617" y="5171158"/>
+                  <a:pt x="2798672" y="5270318"/>
+                  <a:pt x="2332829" y="5630311"/>
+                </a:cubicBezTo>
+                <a:lnTo>
+                  <a:pt x="2137940" y="5795027"/>
+                </a:lnTo>
+                <a:lnTo>
+                  <a:pt x="1950069" y="5630311"/>
+                </a:lnTo>
+                <a:cubicBezTo>
+                  <a:pt x="1484225" y="5270318"/>
+                  <a:pt x="959280" y="5171158"/>
+                  <a:pt x="559353" y="4939455"/>
+                </a:cubicBezTo>
+                <a:cubicBezTo>
+                  <a:pt x="174796" y="4670559"/>
+                  <a:pt x="0" y="4362177"/>
+                  <a:pt x="0" y="3746068"/>
+                </a:cubicBezTo>
+                <a:lnTo>
+                  <a:pt x="0" y="3441681"/>
+                </a:lnTo>
+                <a:lnTo>
+                  <a:pt x="0" y="3042471"/>
+                </a:lnTo>
+                <a:lnTo>
+                  <a:pt x="0" y="2752557"/>
+                </a:lnTo>
+                <a:lnTo>
+                  <a:pt x="0" y="2231503"/>
+                </a:lnTo>
+                <a:lnTo>
+                  <a:pt x="0" y="2048959"/>
+                </a:lnTo>
+                <a:cubicBezTo>
+                  <a:pt x="0" y="1432851"/>
+                  <a:pt x="174797" y="1124469"/>
+                  <a:pt x="559354" y="855573"/>
+                </a:cubicBezTo>
+                <a:cubicBezTo>
+                  <a:pt x="959283" y="623869"/>
+                  <a:pt x="1484227" y="524709"/>
+                  <a:pt x="1950071" y="164715"/>
+                </a:cubicBezTo>
+                <a:close/>
+              </a:path>
+            </a:pathLst>
+          </a:custGeom>
+          <a:noFill/>
+          <a:ln w="25400" cap="rnd" cmpd="sng">
+            <a:solidFill>
+              <a:schemeClr val="lt2"/>
+            </a:solidFill>
+            <a:prstDash val="dot"/>
+            <a:miter lim="800000"/>
+            <a:headEnd type="none" w="sm" len="sm"/>
+            <a:tailEnd type="none" w="sm" len="sm"/>
+          </a:ln>
+        </p:spPr>
+        <p:txBody>
+          <a:bodyPr spcFirstLastPara="1" wrap="square" lIns="91425" tIns="45700" rIns="91425" bIns="45700" anchor="ctr" anchorCtr="0">
+            <a:noAutofit/>
+          </a:bodyPr>
+          <a:lstStyle/>
+          <a:p>
+            <a:pPr marL="0" marR="0" lvl="0" indent="0" algn="ctr" defTabSz="914400" rtl="0" eaLnBrk="1" fontAlgn="auto" latinLnBrk="0" hangingPunct="1">
+              <a:lnSpc>
+                <a:spcPct val="100000"/>
               </a:lnSpc>
               <a:spcBef>
                 <a:spcPts val="0"/>
@@ -21039,307 +21470,124 @@
               <a:buClr>
                 <a:srgbClr val="000000"/>
               </a:buClr>
-              <a:buSzPts val="2800"/>
-              <a:buNone/>
+              <a:buSzTx/>
+              <a:buFont typeface="Arial"/>
+              <a:buNone/>
+              <a:tabLst/>
+              <a:defRPr/>
+            </a:pPr>
+            <a:endParaRPr kumimoji="0" sz="1800" b="0" i="0" u="none" strike="noStrike" kern="0" cap="none" spc="0" normalizeH="0" baseline="0" noProof="0">
+              <a:ln>
+                <a:noFill/>
+              </a:ln>
+              <a:solidFill>
+                <a:srgbClr val="FFFFFF"/>
+              </a:solidFill>
+              <a:effectLst/>
+              <a:uLnTx/>
+              <a:uFillTx/>
+              <a:latin typeface="Sorts Mill Goudy"/>
+              <a:ea typeface="Sorts Mill Goudy"/>
+              <a:cs typeface="Sorts Mill Goudy"/>
+              <a:sym typeface="Sorts Mill Goudy"/>
+            </a:endParaRPr>
+          </a:p>
+        </p:txBody>
+      </p:sp>
+      <p:sp>
+        <p:nvSpPr>
+          <p:cNvPr id="2" name="TextBox 1">
+            <a:extLst>
+              <a:ext uri="{FF2B5EF4-FFF2-40B4-BE49-F238E27FC236}">
+                <a16:creationId xmlns:a16="http://schemas.microsoft.com/office/drawing/2014/main" id="{20943488-E9C7-2665-AC4A-B1DBFC894B8D}"/>
+              </a:ext>
+            </a:extLst>
+          </p:cNvPr>
+          <p:cNvSpPr txBox="1"/>
+          <p:nvPr/>
+        </p:nvSpPr>
+        <p:spPr>
+          <a:xfrm>
+            <a:off x="7767144" y="3095253"/>
+            <a:ext cx="2830342" cy="2062103"/>
+          </a:xfrm>
+          <a:prstGeom prst="rect">
+            <a:avLst/>
+          </a:prstGeom>
+          <a:noFill/>
+        </p:spPr>
+        <p:txBody>
+          <a:bodyPr wrap="square" rtlCol="0">
+            <a:spAutoFit/>
+          </a:bodyPr>
+          <a:lstStyle/>
+          <a:p>
+            <a:pPr marL="342900" indent="-342900">
+              <a:buClr>
+                <a:schemeClr val="bg1"/>
+              </a:buClr>
+              <a:buFont typeface="Arial" panose="020B0604020202020204" pitchFamily="34" charset="0"/>
+              <a:buChar char="•"/>
             </a:pPr>
             <a:r>
-              <a:rPr lang="en-US" b="0" i="0">
+              <a:rPr lang="en-US" sz="3200" dirty="0">
                 <a:solidFill>
-                  <a:srgbClr val="000000"/>
+                  <a:schemeClr val="bg1"/>
                 </a:solidFill>
-                <a:latin typeface="Consolas"/>
-                <a:ea typeface="Consolas"/>
-                <a:cs typeface="Consolas"/>
-                <a:sym typeface="Consolas"/>
               </a:rPr>
-              <a:t>There are 3 other types: tuple, set and dictionary</a:t>
+              <a:t>Lists</a:t>
             </a:r>
-            <a:endParaRPr/>
           </a:p>
           <a:p>
-            <a:pPr marL="0" lvl="0" indent="0" algn="ctr" rtl="0">
-              <a:lnSpc>
-                <a:spcPct val="90000"/>
-              </a:lnSpc>
-              <a:spcBef>
-                <a:spcPts val="1000"/>
-              </a:spcBef>
-              <a:spcAft>
-                <a:spcPts val="0"/>
-              </a:spcAft>
+            <a:pPr marL="342900" indent="-342900">
               <a:buClr>
-                <a:srgbClr val="000000"/>
+                <a:schemeClr val="bg1"/>
               </a:buClr>
-              <a:buSzPts val="2800"/>
-              <a:buNone/>
+              <a:buFont typeface="Arial" panose="020B0604020202020204" pitchFamily="34" charset="0"/>
+              <a:buChar char="•"/>
             </a:pPr>
             <a:r>
-              <a:rPr lang="en-US">
+              <a:rPr lang="en-US" sz="3200" dirty="0">
                 <a:solidFill>
-                  <a:srgbClr val="000000"/>
+                  <a:schemeClr val="bg1"/>
                 </a:solidFill>
-                <a:latin typeface="Consolas"/>
-                <a:ea typeface="Consolas"/>
-                <a:cs typeface="Consolas"/>
-                <a:sym typeface="Consolas"/>
               </a:rPr>
-              <a:t>Used to store multiple items inside a variable</a:t>
+              <a:t>Tuples</a:t>
             </a:r>
-            <a:endParaRPr/>
           </a:p>
           <a:p>
-            <a:pPr marL="0" lvl="0" indent="0" algn="ctr" rtl="0">
-              <a:lnSpc>
-                <a:spcPct val="90000"/>
-              </a:lnSpc>
-              <a:spcBef>
-                <a:spcPts val="1000"/>
-              </a:spcBef>
-              <a:spcAft>
-                <a:spcPts val="0"/>
-              </a:spcAft>
+            <a:pPr marL="342900" indent="-342900">
               <a:buClr>
-                <a:srgbClr val="000000"/>
+                <a:schemeClr val="bg1"/>
               </a:buClr>
-              <a:buSzPts val="2800"/>
-              <a:buNone/>
+              <a:buFont typeface="Arial" panose="020B0604020202020204" pitchFamily="34" charset="0"/>
+              <a:buChar char="•"/>
             </a:pPr>
             <a:r>
-              <a:rPr lang="en-US" b="0" i="0">
+              <a:rPr lang="en-US" sz="3200" dirty="0">
                 <a:solidFill>
-                  <a:srgbClr val="000000"/>
+                  <a:schemeClr val="bg1"/>
                 </a:solidFill>
-                <a:latin typeface="Consolas"/>
-                <a:ea typeface="Consolas"/>
-                <a:cs typeface="Consolas"/>
-                <a:sym typeface="Consolas"/>
               </a:rPr>
-              <a:t>Created always with []</a:t>
+              <a:t>Sets</a:t>
             </a:r>
-            <a:endParaRPr/>
           </a:p>
           <a:p>
-            <a:pPr marL="0" lvl="0" indent="0" algn="ctr" rtl="0">
-              <a:lnSpc>
-                <a:spcPct val="90000"/>
-              </a:lnSpc>
-              <a:spcBef>
-                <a:spcPts val="1000"/>
-              </a:spcBef>
-              <a:spcAft>
-                <a:spcPts val="0"/>
-              </a:spcAft>
+            <a:pPr marL="342900" indent="-342900">
               <a:buClr>
-                <a:srgbClr val="000000"/>
+                <a:schemeClr val="bg1"/>
               </a:buClr>
-              <a:buSzPts val="2800"/>
-              <a:buNone/>
+              <a:buFont typeface="Arial" panose="020B0604020202020204" pitchFamily="34" charset="0"/>
+              <a:buChar char="•"/>
             </a:pPr>
             <a:r>
-              <a:rPr lang="en-US">
+              <a:rPr lang="en-US" sz="3200" dirty="0">
                 <a:solidFill>
-                  <a:srgbClr val="000000"/>
+                  <a:schemeClr val="bg1"/>
                 </a:solidFill>
-                <a:latin typeface="Consolas"/>
-                <a:ea typeface="Consolas"/>
-                <a:cs typeface="Consolas"/>
-                <a:sym typeface="Consolas"/>
               </a:rPr>
-              <a:t>There is always a strict order BUT they can be modified</a:t>
+              <a:t>Dictionaries</a:t>
             </a:r>
-            <a:endParaRPr/>
-          </a:p>
-          <a:p>
-            <a:pPr marL="0" lvl="0" indent="0" algn="ctr" rtl="0">
-              <a:lnSpc>
-                <a:spcPct val="90000"/>
-              </a:lnSpc>
-              <a:spcBef>
-                <a:spcPts val="1000"/>
-              </a:spcBef>
-              <a:spcAft>
-                <a:spcPts val="0"/>
-              </a:spcAft>
-              <a:buClr>
-                <a:srgbClr val="000000"/>
-              </a:buClr>
-              <a:buSzPts val="2800"/>
-              <a:buNone/>
-            </a:pPr>
-            <a:r>
-              <a:rPr lang="en-US" b="0" i="0">
-                <a:solidFill>
-                  <a:srgbClr val="000000"/>
-                </a:solidFill>
-                <a:latin typeface="Consolas"/>
-                <a:ea typeface="Consolas"/>
-                <a:cs typeface="Consolas"/>
-                <a:sym typeface="Consolas"/>
-              </a:rPr>
-              <a:t>You CAN have duplicates in a list</a:t>
-            </a:r>
-            <a:endParaRPr/>
-          </a:p>
-          <a:p>
-            <a:pPr marL="0" lvl="0" indent="0" algn="ctr" rtl="0">
-              <a:lnSpc>
-                <a:spcPct val="90000"/>
-              </a:lnSpc>
-              <a:spcBef>
-                <a:spcPts val="1000"/>
-              </a:spcBef>
-              <a:spcAft>
-                <a:spcPts val="0"/>
-              </a:spcAft>
-              <a:buClr>
-                <a:srgbClr val="000000"/>
-              </a:buClr>
-              <a:buSzPts val="2800"/>
-              <a:buNone/>
-            </a:pPr>
-            <a:r>
-              <a:rPr lang="en-US">
-                <a:solidFill>
-                  <a:srgbClr val="000000"/>
-                </a:solidFill>
-                <a:latin typeface="Consolas"/>
-                <a:ea typeface="Consolas"/>
-                <a:cs typeface="Consolas"/>
-                <a:sym typeface="Consolas"/>
-              </a:rPr>
-              <a:t>You can make lists out of any data type</a:t>
-            </a:r>
-            <a:endParaRPr/>
-          </a:p>
-          <a:p>
-            <a:pPr marL="0" lvl="0" indent="0" algn="ctr" rtl="0">
-              <a:lnSpc>
-                <a:spcPct val="90000"/>
-              </a:lnSpc>
-              <a:spcBef>
-                <a:spcPts val="1000"/>
-              </a:spcBef>
-              <a:spcAft>
-                <a:spcPts val="0"/>
-              </a:spcAft>
-              <a:buClr>
-                <a:schemeClr val="dk1"/>
-              </a:buClr>
-              <a:buSzPts val="2800"/>
-              <a:buNone/>
-            </a:pPr>
-            <a:endParaRPr b="0" i="0">
-              <a:solidFill>
-                <a:srgbClr val="000000"/>
-              </a:solidFill>
-              <a:latin typeface="Consolas"/>
-              <a:ea typeface="Consolas"/>
-              <a:cs typeface="Consolas"/>
-              <a:sym typeface="Consolas"/>
-            </a:endParaRPr>
-          </a:p>
-          <a:p>
-            <a:pPr marL="0" lvl="0" indent="0" algn="ctr" rtl="0">
-              <a:lnSpc>
-                <a:spcPct val="90000"/>
-              </a:lnSpc>
-              <a:spcBef>
-                <a:spcPts val="1000"/>
-              </a:spcBef>
-              <a:spcAft>
-                <a:spcPts val="0"/>
-              </a:spcAft>
-              <a:buClr>
-                <a:srgbClr val="000000"/>
-              </a:buClr>
-              <a:buSzPts val="2800"/>
-              <a:buNone/>
-            </a:pPr>
-            <a:r>
-              <a:rPr lang="en-US" b="0" i="0">
-                <a:solidFill>
-                  <a:srgbClr val="000000"/>
-                </a:solidFill>
-                <a:latin typeface="Consolas"/>
-                <a:ea typeface="Consolas"/>
-                <a:cs typeface="Consolas"/>
-                <a:sym typeface="Consolas"/>
-              </a:rPr>
-              <a:t>thislist = [</a:t>
-            </a:r>
-            <a:r>
-              <a:rPr lang="en-US" b="0" i="0">
-                <a:solidFill>
-                  <a:srgbClr val="A52A2A"/>
-                </a:solidFill>
-                <a:latin typeface="Consolas"/>
-                <a:ea typeface="Consolas"/>
-                <a:cs typeface="Consolas"/>
-                <a:sym typeface="Consolas"/>
-              </a:rPr>
-              <a:t>"apple"</a:t>
-            </a:r>
-            <a:r>
-              <a:rPr lang="en-US" b="0" i="0">
-                <a:solidFill>
-                  <a:srgbClr val="000000"/>
-                </a:solidFill>
-                <a:latin typeface="Consolas"/>
-                <a:ea typeface="Consolas"/>
-                <a:cs typeface="Consolas"/>
-                <a:sym typeface="Consolas"/>
-              </a:rPr>
-              <a:t>, </a:t>
-            </a:r>
-            <a:r>
-              <a:rPr lang="en-US" b="0" i="0">
-                <a:solidFill>
-                  <a:srgbClr val="A52A2A"/>
-                </a:solidFill>
-                <a:latin typeface="Consolas"/>
-                <a:ea typeface="Consolas"/>
-                <a:cs typeface="Consolas"/>
-                <a:sym typeface="Consolas"/>
-              </a:rPr>
-              <a:t>"banana"</a:t>
-            </a:r>
-            <a:r>
-              <a:rPr lang="en-US" b="0" i="0">
-                <a:solidFill>
-                  <a:srgbClr val="000000"/>
-                </a:solidFill>
-                <a:latin typeface="Consolas"/>
-                <a:ea typeface="Consolas"/>
-                <a:cs typeface="Consolas"/>
-                <a:sym typeface="Consolas"/>
-              </a:rPr>
-              <a:t>, </a:t>
-            </a:r>
-            <a:r>
-              <a:rPr lang="en-US" b="0" i="0">
-                <a:solidFill>
-                  <a:srgbClr val="A52A2A"/>
-                </a:solidFill>
-                <a:latin typeface="Consolas"/>
-                <a:ea typeface="Consolas"/>
-                <a:cs typeface="Consolas"/>
-                <a:sym typeface="Consolas"/>
-              </a:rPr>
-              <a:t>"cherry"</a:t>
-            </a:r>
-            <a:r>
-              <a:rPr lang="en-US" b="0" i="0">
-                <a:solidFill>
-                  <a:srgbClr val="000000"/>
-                </a:solidFill>
-                <a:latin typeface="Consolas"/>
-                <a:ea typeface="Consolas"/>
-                <a:cs typeface="Consolas"/>
-                <a:sym typeface="Consolas"/>
-              </a:rPr>
-              <a:t>]</a:t>
-            </a:r>
-            <a:endParaRPr/>
           </a:p>
         </p:txBody>
       </p:sp>
@@ -21348,18 +21596,9 @@
   <p:clrMapOvr>
     <a:masterClrMapping/>
   </p:clrMapOvr>
-  <mc:AlternateContent xmlns:mc="http://schemas.openxmlformats.org/markup-compatibility/2006" xmlns:p14="http://schemas.microsoft.com/office/powerpoint/2010/main">
-    <mc:Choice Requires="p14">
-      <p:transition spd="slow" p14:dur="1500">
-        <p:split orient="vert"/>
-      </p:transition>
-    </mc:Choice>
-    <mc:Fallback xmlns="">
-      <p:transition spd="slow">
-        <p:split orient="vert"/>
-      </p:transition>
-    </mc:Fallback>
-  </mc:AlternateContent>
+  <p:transition spd="slow">
+    <p:wipe/>
+  </p:transition>
   <p:timing>
     <p:tnLst>
       <p:par>
@@ -21372,6 +21611,9 @@
                     <p:cTn id="3" fill="hold">
                       <p:stCondLst>
                         <p:cond delay="indefinite"/>
+                        <p:cond evt="onBegin" delay="0">
+                          <p:tn val="2"/>
+                        </p:cond>
                       </p:stCondLst>
                       <p:childTnLst>
                         <p:par>
@@ -21381,9 +21623,9 @@
                             </p:stCondLst>
                             <p:childTnLst>
                               <p:par>
-                                <p:cTn id="5" presetID="2" presetClass="entr" presetSubtype="4" fill="hold" nodeType="clickEffect">
+                                <p:cTn id="5" presetID="10" presetClass="entr" presetSubtype="0" fill="hold" nodeType="withEffect">
                                   <p:stCondLst>
-                                    <p:cond delay="0"/>
+                                    <p:cond delay="2000"/>
                                   </p:stCondLst>
                                   <p:childTnLst>
                                     <p:set>
@@ -21394,7 +21636,7 @@
                                           </p:stCondLst>
                                         </p:cTn>
                                         <p:tgtEl>
-                                          <p:spTgt spid="299">
+                                          <p:spTgt spid="103">
                                             <p:txEl>
                                               <p:pRg st="0" end="0"/>
                                             </p:txEl>
@@ -21408,73 +21650,36 @@
                                         <p:strVal val="visible"/>
                                       </p:to>
                                     </p:set>
-                                    <p:anim calcmode="lin" valueType="num">
-                                      <p:cBhvr additive="base">
-                                        <p:cTn id="7" dur="500"/>
+                                    <p:animEffect transition="in" filter="fade">
+                                      <p:cBhvr>
+                                        <p:cTn id="7" dur="400"/>
                                         <p:tgtEl>
-                                          <p:spTgt spid="299">
+                                          <p:spTgt spid="103">
                                             <p:txEl>
                                               <p:pRg st="0" end="0"/>
                                             </p:txEl>
                                           </p:spTgt>
                                         </p:tgtEl>
-                                        <p:attrNameLst>
-                                          <p:attrName>ppt_y</p:attrName>
-                                        </p:attrNameLst>
                                       </p:cBhvr>
-                                      <p:tavLst>
-                                        <p:tav tm="0">
-                                          <p:val>
-                                            <p:strVal val="#ppt_y+1"/>
-                                          </p:val>
-                                        </p:tav>
-                                        <p:tav tm="100000">
-                                          <p:val>
-                                            <p:strVal val="#ppt_y"/>
-                                          </p:val>
-                                        </p:tav>
-                                      </p:tavLst>
-                                    </p:anim>
+                                    </p:animEffect>
                                   </p:childTnLst>
                                 </p:cTn>
                               </p:par>
-                            </p:childTnLst>
-                          </p:cTn>
-                        </p:par>
-                      </p:childTnLst>
-                    </p:cTn>
-                  </p:par>
-                  <p:par>
-                    <p:cTn id="8" fill="hold">
-                      <p:stCondLst>
-                        <p:cond delay="indefinite"/>
-                      </p:stCondLst>
-                      <p:childTnLst>
-                        <p:par>
-                          <p:cTn id="9" fill="hold">
-                            <p:stCondLst>
-                              <p:cond delay="0"/>
-                            </p:stCondLst>
-                            <p:childTnLst>
                               <p:par>
-                                <p:cTn id="10" presetID="2" presetClass="entr" presetSubtype="4" fill="hold" nodeType="clickEffect">
+                                <p:cTn id="8" presetID="10" presetClass="entr" presetSubtype="0" fill="hold" nodeType="withEffect">
                                   <p:stCondLst>
-                                    <p:cond delay="0"/>
+                                    <p:cond delay="1000"/>
                                   </p:stCondLst>
                                   <p:childTnLst>
                                     <p:set>
                                       <p:cBhvr>
-                                        <p:cTn id="11" dur="1" fill="hold">
+                                        <p:cTn id="9" dur="1" fill="hold">
                                           <p:stCondLst>
                                             <p:cond delay="0"/>
                                           </p:stCondLst>
                                         </p:cTn>
                                         <p:tgtEl>
-                                          <p:spTgt spid="299">
-                                            <p:txEl>
-                                              <p:pRg st="1" end="1"/>
-                                            </p:txEl>
-                                          </p:spTgt>
+                                          <p:spTgt spid="102"/>
                                         </p:tgtEl>
                                         <p:attrNameLst>
                                           <p:attrName>style.visibility</p:attrName>
@@ -21484,489 +21689,14 @@
                                         <p:strVal val="visible"/>
                                       </p:to>
                                     </p:set>
-                                    <p:anim calcmode="lin" valueType="num">
-                                      <p:cBhvr additive="base">
-                                        <p:cTn id="12" dur="500"/>
+                                    <p:animEffect transition="in" filter="fade">
+                                      <p:cBhvr>
+                                        <p:cTn id="10" dur="400"/>
                                         <p:tgtEl>
-                                          <p:spTgt spid="299">
-                                            <p:txEl>
-                                              <p:pRg st="1" end="1"/>
-                                            </p:txEl>
-                                          </p:spTgt>
+                                          <p:spTgt spid="102"/>
                                         </p:tgtEl>
-                                        <p:attrNameLst>
-                                          <p:attrName>ppt_y</p:attrName>
-                                        </p:attrNameLst>
                                       </p:cBhvr>
-                                      <p:tavLst>
-                                        <p:tav tm="0">
-                                          <p:val>
-                                            <p:strVal val="#ppt_y+1"/>
-                                          </p:val>
-                                        </p:tav>
-                                        <p:tav tm="100000">
-                                          <p:val>
-                                            <p:strVal val="#ppt_y"/>
-                                          </p:val>
-                                        </p:tav>
-                                      </p:tavLst>
-                                    </p:anim>
-                                  </p:childTnLst>
-                                </p:cTn>
-                              </p:par>
-                            </p:childTnLst>
-                          </p:cTn>
-                        </p:par>
-                      </p:childTnLst>
-                    </p:cTn>
-                  </p:par>
-                  <p:par>
-                    <p:cTn id="13" fill="hold">
-                      <p:stCondLst>
-                        <p:cond delay="indefinite"/>
-                      </p:stCondLst>
-                      <p:childTnLst>
-                        <p:par>
-                          <p:cTn id="14" fill="hold">
-                            <p:stCondLst>
-                              <p:cond delay="0"/>
-                            </p:stCondLst>
-                            <p:childTnLst>
-                              <p:par>
-                                <p:cTn id="15" presetID="2" presetClass="entr" presetSubtype="4" fill="hold" nodeType="clickEffect">
-                                  <p:stCondLst>
-                                    <p:cond delay="0"/>
-                                  </p:stCondLst>
-                                  <p:childTnLst>
-                                    <p:set>
-                                      <p:cBhvr>
-                                        <p:cTn id="16" dur="1" fill="hold">
-                                          <p:stCondLst>
-                                            <p:cond delay="0"/>
-                                          </p:stCondLst>
-                                        </p:cTn>
-                                        <p:tgtEl>
-                                          <p:spTgt spid="299">
-                                            <p:txEl>
-                                              <p:pRg st="2" end="2"/>
-                                            </p:txEl>
-                                          </p:spTgt>
-                                        </p:tgtEl>
-                                        <p:attrNameLst>
-                                          <p:attrName>style.visibility</p:attrName>
-                                        </p:attrNameLst>
-                                      </p:cBhvr>
-                                      <p:to>
-                                        <p:strVal val="visible"/>
-                                      </p:to>
-                                    </p:set>
-                                    <p:anim calcmode="lin" valueType="num">
-                                      <p:cBhvr additive="base">
-                                        <p:cTn id="17" dur="500"/>
-                                        <p:tgtEl>
-                                          <p:spTgt spid="299">
-                                            <p:txEl>
-                                              <p:pRg st="2" end="2"/>
-                                            </p:txEl>
-                                          </p:spTgt>
-                                        </p:tgtEl>
-                                        <p:attrNameLst>
-                                          <p:attrName>ppt_y</p:attrName>
-                                        </p:attrNameLst>
-                                      </p:cBhvr>
-                                      <p:tavLst>
-                                        <p:tav tm="0">
-                                          <p:val>
-                                            <p:strVal val="#ppt_y+1"/>
-                                          </p:val>
-                                        </p:tav>
-                                        <p:tav tm="100000">
-                                          <p:val>
-                                            <p:strVal val="#ppt_y"/>
-                                          </p:val>
-                                        </p:tav>
-                                      </p:tavLst>
-                                    </p:anim>
-                                  </p:childTnLst>
-                                </p:cTn>
-                              </p:par>
-                            </p:childTnLst>
-                          </p:cTn>
-                        </p:par>
-                      </p:childTnLst>
-                    </p:cTn>
-                  </p:par>
-                  <p:par>
-                    <p:cTn id="18" fill="hold">
-                      <p:stCondLst>
-                        <p:cond delay="indefinite"/>
-                      </p:stCondLst>
-                      <p:childTnLst>
-                        <p:par>
-                          <p:cTn id="19" fill="hold">
-                            <p:stCondLst>
-                              <p:cond delay="0"/>
-                            </p:stCondLst>
-                            <p:childTnLst>
-                              <p:par>
-                                <p:cTn id="20" presetID="2" presetClass="entr" presetSubtype="4" fill="hold" nodeType="clickEffect">
-                                  <p:stCondLst>
-                                    <p:cond delay="0"/>
-                                  </p:stCondLst>
-                                  <p:childTnLst>
-                                    <p:set>
-                                      <p:cBhvr>
-                                        <p:cTn id="21" dur="1" fill="hold">
-                                          <p:stCondLst>
-                                            <p:cond delay="0"/>
-                                          </p:stCondLst>
-                                        </p:cTn>
-                                        <p:tgtEl>
-                                          <p:spTgt spid="299">
-                                            <p:txEl>
-                                              <p:pRg st="3" end="3"/>
-                                            </p:txEl>
-                                          </p:spTgt>
-                                        </p:tgtEl>
-                                        <p:attrNameLst>
-                                          <p:attrName>style.visibility</p:attrName>
-                                        </p:attrNameLst>
-                                      </p:cBhvr>
-                                      <p:to>
-                                        <p:strVal val="visible"/>
-                                      </p:to>
-                                    </p:set>
-                                    <p:anim calcmode="lin" valueType="num">
-                                      <p:cBhvr additive="base">
-                                        <p:cTn id="22" dur="500"/>
-                                        <p:tgtEl>
-                                          <p:spTgt spid="299">
-                                            <p:txEl>
-                                              <p:pRg st="3" end="3"/>
-                                            </p:txEl>
-                                          </p:spTgt>
-                                        </p:tgtEl>
-                                        <p:attrNameLst>
-                                          <p:attrName>ppt_y</p:attrName>
-                                        </p:attrNameLst>
-                                      </p:cBhvr>
-                                      <p:tavLst>
-                                        <p:tav tm="0">
-                                          <p:val>
-                                            <p:strVal val="#ppt_y+1"/>
-                                          </p:val>
-                                        </p:tav>
-                                        <p:tav tm="100000">
-                                          <p:val>
-                                            <p:strVal val="#ppt_y"/>
-                                          </p:val>
-                                        </p:tav>
-                                      </p:tavLst>
-                                    </p:anim>
-                                  </p:childTnLst>
-                                </p:cTn>
-                              </p:par>
-                            </p:childTnLst>
-                          </p:cTn>
-                        </p:par>
-                      </p:childTnLst>
-                    </p:cTn>
-                  </p:par>
-                  <p:par>
-                    <p:cTn id="23" fill="hold">
-                      <p:stCondLst>
-                        <p:cond delay="indefinite"/>
-                      </p:stCondLst>
-                      <p:childTnLst>
-                        <p:par>
-                          <p:cTn id="24" fill="hold">
-                            <p:stCondLst>
-                              <p:cond delay="0"/>
-                            </p:stCondLst>
-                            <p:childTnLst>
-                              <p:par>
-                                <p:cTn id="25" presetID="2" presetClass="entr" presetSubtype="4" fill="hold" nodeType="clickEffect">
-                                  <p:stCondLst>
-                                    <p:cond delay="0"/>
-                                  </p:stCondLst>
-                                  <p:childTnLst>
-                                    <p:set>
-                                      <p:cBhvr>
-                                        <p:cTn id="26" dur="1" fill="hold">
-                                          <p:stCondLst>
-                                            <p:cond delay="0"/>
-                                          </p:stCondLst>
-                                        </p:cTn>
-                                        <p:tgtEl>
-                                          <p:spTgt spid="299">
-                                            <p:txEl>
-                                              <p:pRg st="4" end="4"/>
-                                            </p:txEl>
-                                          </p:spTgt>
-                                        </p:tgtEl>
-                                        <p:attrNameLst>
-                                          <p:attrName>style.visibility</p:attrName>
-                                        </p:attrNameLst>
-                                      </p:cBhvr>
-                                      <p:to>
-                                        <p:strVal val="visible"/>
-                                      </p:to>
-                                    </p:set>
-                                    <p:anim calcmode="lin" valueType="num">
-                                      <p:cBhvr additive="base">
-                                        <p:cTn id="27" dur="500"/>
-                                        <p:tgtEl>
-                                          <p:spTgt spid="299">
-                                            <p:txEl>
-                                              <p:pRg st="4" end="4"/>
-                                            </p:txEl>
-                                          </p:spTgt>
-                                        </p:tgtEl>
-                                        <p:attrNameLst>
-                                          <p:attrName>ppt_y</p:attrName>
-                                        </p:attrNameLst>
-                                      </p:cBhvr>
-                                      <p:tavLst>
-                                        <p:tav tm="0">
-                                          <p:val>
-                                            <p:strVal val="#ppt_y+1"/>
-                                          </p:val>
-                                        </p:tav>
-                                        <p:tav tm="100000">
-                                          <p:val>
-                                            <p:strVal val="#ppt_y"/>
-                                          </p:val>
-                                        </p:tav>
-                                      </p:tavLst>
-                                    </p:anim>
-                                  </p:childTnLst>
-                                </p:cTn>
-                              </p:par>
-                            </p:childTnLst>
-                          </p:cTn>
-                        </p:par>
-                      </p:childTnLst>
-                    </p:cTn>
-                  </p:par>
-                  <p:par>
-                    <p:cTn id="28" fill="hold">
-                      <p:stCondLst>
-                        <p:cond delay="indefinite"/>
-                      </p:stCondLst>
-                      <p:childTnLst>
-                        <p:par>
-                          <p:cTn id="29" fill="hold">
-                            <p:stCondLst>
-                              <p:cond delay="0"/>
-                            </p:stCondLst>
-                            <p:childTnLst>
-                              <p:par>
-                                <p:cTn id="30" presetID="2" presetClass="entr" presetSubtype="4" fill="hold" nodeType="clickEffect">
-                                  <p:stCondLst>
-                                    <p:cond delay="0"/>
-                                  </p:stCondLst>
-                                  <p:childTnLst>
-                                    <p:set>
-                                      <p:cBhvr>
-                                        <p:cTn id="31" dur="1" fill="hold">
-                                          <p:stCondLst>
-                                            <p:cond delay="0"/>
-                                          </p:stCondLst>
-                                        </p:cTn>
-                                        <p:tgtEl>
-                                          <p:spTgt spid="299">
-                                            <p:txEl>
-                                              <p:pRg st="5" end="5"/>
-                                            </p:txEl>
-                                          </p:spTgt>
-                                        </p:tgtEl>
-                                        <p:attrNameLst>
-                                          <p:attrName>style.visibility</p:attrName>
-                                        </p:attrNameLst>
-                                      </p:cBhvr>
-                                      <p:to>
-                                        <p:strVal val="visible"/>
-                                      </p:to>
-                                    </p:set>
-                                    <p:anim calcmode="lin" valueType="num">
-                                      <p:cBhvr additive="base">
-                                        <p:cTn id="32" dur="500"/>
-                                        <p:tgtEl>
-                                          <p:spTgt spid="299">
-                                            <p:txEl>
-                                              <p:pRg st="5" end="5"/>
-                                            </p:txEl>
-                                          </p:spTgt>
-                                        </p:tgtEl>
-                                        <p:attrNameLst>
-                                          <p:attrName>ppt_y</p:attrName>
-                                        </p:attrNameLst>
-                                      </p:cBhvr>
-                                      <p:tavLst>
-                                        <p:tav tm="0">
-                                          <p:val>
-                                            <p:strVal val="#ppt_y+1"/>
-                                          </p:val>
-                                        </p:tav>
-                                        <p:tav tm="100000">
-                                          <p:val>
-                                            <p:strVal val="#ppt_y"/>
-                                          </p:val>
-                                        </p:tav>
-                                      </p:tavLst>
-                                    </p:anim>
-                                  </p:childTnLst>
-                                </p:cTn>
-                              </p:par>
-                            </p:childTnLst>
-                          </p:cTn>
-                        </p:par>
-                      </p:childTnLst>
-                    </p:cTn>
-                  </p:par>
-                  <p:par>
-                    <p:cTn id="33" fill="hold">
-                      <p:stCondLst>
-                        <p:cond delay="indefinite"/>
-                      </p:stCondLst>
-                      <p:childTnLst>
-                        <p:par>
-                          <p:cTn id="34" fill="hold">
-                            <p:stCondLst>
-                              <p:cond delay="0"/>
-                            </p:stCondLst>
-                            <p:childTnLst>
-                              <p:par>
-                                <p:cTn id="35" presetID="2" presetClass="entr" presetSubtype="4" fill="hold" nodeType="clickEffect">
-                                  <p:stCondLst>
-                                    <p:cond delay="0"/>
-                                  </p:stCondLst>
-                                  <p:childTnLst>
-                                    <p:set>
-                                      <p:cBhvr>
-                                        <p:cTn id="36" dur="1" fill="hold">
-                                          <p:stCondLst>
-                                            <p:cond delay="0"/>
-                                          </p:stCondLst>
-                                        </p:cTn>
-                                        <p:tgtEl>
-                                          <p:spTgt spid="299">
-                                            <p:txEl>
-                                              <p:pRg st="6" end="6"/>
-                                            </p:txEl>
-                                          </p:spTgt>
-                                        </p:tgtEl>
-                                        <p:attrNameLst>
-                                          <p:attrName>style.visibility</p:attrName>
-                                        </p:attrNameLst>
-                                      </p:cBhvr>
-                                      <p:to>
-                                        <p:strVal val="visible"/>
-                                      </p:to>
-                                    </p:set>
-                                    <p:anim calcmode="lin" valueType="num">
-                                      <p:cBhvr additive="base">
-                                        <p:cTn id="37" dur="500"/>
-                                        <p:tgtEl>
-                                          <p:spTgt spid="299">
-                                            <p:txEl>
-                                              <p:pRg st="6" end="6"/>
-                                            </p:txEl>
-                                          </p:spTgt>
-                                        </p:tgtEl>
-                                        <p:attrNameLst>
-                                          <p:attrName>ppt_y</p:attrName>
-                                        </p:attrNameLst>
-                                      </p:cBhvr>
-                                      <p:tavLst>
-                                        <p:tav tm="0">
-                                          <p:val>
-                                            <p:strVal val="#ppt_y+1"/>
-                                          </p:val>
-                                        </p:tav>
-                                        <p:tav tm="100000">
-                                          <p:val>
-                                            <p:strVal val="#ppt_y"/>
-                                          </p:val>
-                                        </p:tav>
-                                      </p:tavLst>
-                                    </p:anim>
-                                  </p:childTnLst>
-                                </p:cTn>
-                              </p:par>
-                            </p:childTnLst>
-                          </p:cTn>
-                        </p:par>
-                      </p:childTnLst>
-                    </p:cTn>
-                  </p:par>
-                  <p:par>
-                    <p:cTn id="38" fill="hold">
-                      <p:stCondLst>
-                        <p:cond delay="indefinite"/>
-                      </p:stCondLst>
-                      <p:childTnLst>
-                        <p:par>
-                          <p:cTn id="39" fill="hold">
-                            <p:stCondLst>
-                              <p:cond delay="0"/>
-                            </p:stCondLst>
-                            <p:childTnLst>
-                              <p:par>
-                                <p:cTn id="40" presetID="2" presetClass="entr" presetSubtype="4" fill="hold" nodeType="clickEffect">
-                                  <p:stCondLst>
-                                    <p:cond delay="0"/>
-                                  </p:stCondLst>
-                                  <p:childTnLst>
-                                    <p:set>
-                                      <p:cBhvr>
-                                        <p:cTn id="41" dur="1" fill="hold">
-                                          <p:stCondLst>
-                                            <p:cond delay="0"/>
-                                          </p:stCondLst>
-                                        </p:cTn>
-                                        <p:tgtEl>
-                                          <p:spTgt spid="299">
-                                            <p:txEl>
-                                              <p:pRg st="7" end="7"/>
-                                            </p:txEl>
-                                          </p:spTgt>
-                                        </p:tgtEl>
-                                        <p:attrNameLst>
-                                          <p:attrName>style.visibility</p:attrName>
-                                        </p:attrNameLst>
-                                      </p:cBhvr>
-                                      <p:to>
-                                        <p:strVal val="visible"/>
-                                      </p:to>
-                                    </p:set>
-                                    <p:anim calcmode="lin" valueType="num">
-                                      <p:cBhvr additive="base">
-                                        <p:cTn id="42" dur="500"/>
-                                        <p:tgtEl>
-                                          <p:spTgt spid="299">
-                                            <p:txEl>
-                                              <p:pRg st="7" end="7"/>
-                                            </p:txEl>
-                                          </p:spTgt>
-                                        </p:tgtEl>
-                                        <p:attrNameLst>
-                                          <p:attrName>ppt_y</p:attrName>
-                                        </p:attrNameLst>
-                                      </p:cBhvr>
-                                      <p:tavLst>
-                                        <p:tav tm="0">
-                                          <p:val>
-                                            <p:strVal val="#ppt_y+1"/>
-                                          </p:val>
-                                        </p:tav>
-                                        <p:tav tm="100000">
-                                          <p:val>
-                                            <p:strVal val="#ppt_y"/>
-                                          </p:val>
-                                        </p:tav>
-                                      </p:tavLst>
-                                    </p:anim>
+                                    </p:animEffect>
                                   </p:childTnLst>
                                 </p:cTn>
                               </p:par>
@@ -31141,17 +30871,9 @@
 <file path=ppt/slides/slide2.xml><?xml version="1.0" encoding="utf-8"?>
 <p:sld xmlns:a="http://schemas.openxmlformats.org/drawingml/2006/main" xmlns:r="http://schemas.openxmlformats.org/officeDocument/2006/relationships" xmlns:p="http://schemas.openxmlformats.org/presentationml/2006/main">
   <p:cSld>
-    <p:bg>
-      <p:bgPr>
-        <a:solidFill>
-          <a:schemeClr val="lt2"/>
-        </a:solidFill>
-        <a:effectLst/>
-      </p:bgPr>
-    </p:bg>
     <p:spTree>
       <p:nvGrpSpPr>
-        <p:cNvPr id="1" name="Shape 98"/>
+        <p:cNvPr id="1" name="Shape 297"/>
         <p:cNvGrpSpPr/>
         <p:nvPr/>
       </p:nvGrpSpPr>
@@ -31165,264 +30887,18 @@
       </p:grpSpPr>
       <p:sp>
         <p:nvSpPr>
-          <p:cNvPr id="99" name="Google Shape;99;p1"/>
-          <p:cNvSpPr/>
-          <p:nvPr/>
-        </p:nvSpPr>
-        <p:spPr>
-          <a:xfrm>
-            <a:off x="0" y="0"/>
-            <a:ext cx="12192000" cy="6858000"/>
-          </a:xfrm>
-          <a:prstGeom prst="rect">
-            <a:avLst/>
-          </a:prstGeom>
-          <a:solidFill>
-            <a:schemeClr val="lt2"/>
-          </a:solidFill>
-          <a:ln>
-            <a:noFill/>
-          </a:ln>
-        </p:spPr>
-        <p:txBody>
-          <a:bodyPr spcFirstLastPara="1" wrap="square" lIns="91425" tIns="45700" rIns="91425" bIns="45700" anchor="ctr" anchorCtr="0">
-            <a:noAutofit/>
-          </a:bodyPr>
-          <a:lstStyle/>
-          <a:p>
-            <a:pPr marL="0" marR="0" lvl="0" indent="0" algn="ctr" defTabSz="914400" rtl="0" eaLnBrk="1" fontAlgn="auto" latinLnBrk="0" hangingPunct="1">
-              <a:lnSpc>
-                <a:spcPct val="100000"/>
-              </a:lnSpc>
-              <a:spcBef>
-                <a:spcPts val="0"/>
-              </a:spcBef>
-              <a:spcAft>
-                <a:spcPts val="0"/>
-              </a:spcAft>
-              <a:buClr>
-                <a:srgbClr val="000000"/>
-              </a:buClr>
-              <a:buSzTx/>
-              <a:buFont typeface="Arial"/>
-              <a:buNone/>
-              <a:tabLst/>
-              <a:defRPr/>
-            </a:pPr>
-            <a:endParaRPr kumimoji="0" sz="1800" b="0" i="0" u="none" strike="noStrike" kern="0" cap="none" spc="0" normalizeH="0" baseline="0" noProof="0">
-              <a:ln>
-                <a:noFill/>
-              </a:ln>
-              <a:solidFill>
-                <a:srgbClr val="FFFFFF"/>
-              </a:solidFill>
-              <a:effectLst/>
-              <a:uLnTx/>
-              <a:uFillTx/>
-              <a:latin typeface="Sorts Mill Goudy"/>
-              <a:ea typeface="Sorts Mill Goudy"/>
-              <a:cs typeface="Sorts Mill Goudy"/>
-              <a:sym typeface="Sorts Mill Goudy"/>
-            </a:endParaRPr>
-          </a:p>
-        </p:txBody>
-      </p:sp>
-      <p:pic>
-        <p:nvPicPr>
-          <p:cNvPr id="100" name="Google Shape;100;p1" descr="Computer script on a screen"/>
-          <p:cNvPicPr preferRelativeResize="0"/>
-          <p:nvPr/>
-        </p:nvPicPr>
-        <p:blipFill rotWithShape="1">
-          <a:blip r:embed="rId3">
-            <a:alphaModFix/>
-          </a:blip>
-          <a:srcRect t="5981" b="9749"/>
-          <a:stretch/>
-        </p:blipFill>
-        <p:spPr>
-          <a:xfrm>
-            <a:off x="20" y="10"/>
-            <a:ext cx="12191979" cy="6857989"/>
-          </a:xfrm>
-          <a:prstGeom prst="rect">
-            <a:avLst/>
-          </a:prstGeom>
-          <a:noFill/>
-          <a:ln>
-            <a:noFill/>
-          </a:ln>
-        </p:spPr>
-      </p:pic>
-      <p:sp>
-        <p:nvSpPr>
-          <p:cNvPr id="101" name="Google Shape;101;p1"/>
-          <p:cNvSpPr/>
-          <p:nvPr/>
-        </p:nvSpPr>
-        <p:spPr>
-          <a:xfrm>
-            <a:off x="1109595" y="805231"/>
-            <a:ext cx="3876811" cy="5245563"/>
-          </a:xfrm>
-          <a:custGeom>
-            <a:avLst/>
-            <a:gdLst/>
-            <a:ahLst/>
-            <a:cxnLst/>
-            <a:rect l="l" t="t" r="r" b="b"/>
-            <a:pathLst>
-              <a:path w="3876811" h="5245563" extrusionOk="0">
-                <a:moveTo>
-                  <a:pt x="1941583" y="0"/>
-                </a:moveTo>
-                <a:lnTo>
-                  <a:pt x="2111641" y="149097"/>
-                </a:lnTo>
-                <a:cubicBezTo>
-                  <a:pt x="2533315" y="474958"/>
-                  <a:pt x="3008487" y="564716"/>
-                  <a:pt x="3370493" y="774451"/>
-                </a:cubicBezTo>
-                <a:cubicBezTo>
-                  <a:pt x="3718590" y="1017851"/>
-                  <a:pt x="3876811" y="1296993"/>
-                  <a:pt x="3876811" y="1854684"/>
-                </a:cubicBezTo>
-                <a:lnTo>
-                  <a:pt x="3876811" y="2019920"/>
-                </a:lnTo>
-                <a:lnTo>
-                  <a:pt x="3876811" y="2491569"/>
-                </a:lnTo>
-                <a:lnTo>
-                  <a:pt x="3876811" y="2753995"/>
-                </a:lnTo>
-                <a:lnTo>
-                  <a:pt x="3876811" y="3115353"/>
-                </a:lnTo>
-                <a:lnTo>
-                  <a:pt x="3876811" y="3390879"/>
-                </a:lnTo>
-                <a:cubicBezTo>
-                  <a:pt x="3876811" y="3948571"/>
-                  <a:pt x="3718588" y="4227713"/>
-                  <a:pt x="3370493" y="4471114"/>
-                </a:cubicBezTo>
-                <a:cubicBezTo>
-                  <a:pt x="3008484" y="4680847"/>
-                  <a:pt x="2533312" y="4770605"/>
-                  <a:pt x="2111639" y="5096465"/>
-                </a:cubicBezTo>
-                <a:lnTo>
-                  <a:pt x="1935228" y="5245563"/>
-                </a:lnTo>
-                <a:lnTo>
-                  <a:pt x="1765171" y="5096465"/>
-                </a:lnTo>
-                <a:cubicBezTo>
-                  <a:pt x="1343496" y="4770605"/>
-                  <a:pt x="868325" y="4680847"/>
-                  <a:pt x="506317" y="4471114"/>
-                </a:cubicBezTo>
-                <a:cubicBezTo>
-                  <a:pt x="158223" y="4227713"/>
-                  <a:pt x="0" y="3948571"/>
-                  <a:pt x="0" y="3390879"/>
-                </a:cubicBezTo>
-                <a:lnTo>
-                  <a:pt x="0" y="3115353"/>
-                </a:lnTo>
-                <a:lnTo>
-                  <a:pt x="0" y="2753995"/>
-                </a:lnTo>
-                <a:lnTo>
-                  <a:pt x="0" y="2491569"/>
-                </a:lnTo>
-                <a:lnTo>
-                  <a:pt x="0" y="2019920"/>
-                </a:lnTo>
-                <a:lnTo>
-                  <a:pt x="0" y="1854684"/>
-                </a:lnTo>
-                <a:cubicBezTo>
-                  <a:pt x="0" y="1296993"/>
-                  <a:pt x="158224" y="1017851"/>
-                  <a:pt x="506318" y="774451"/>
-                </a:cubicBezTo>
-                <a:cubicBezTo>
-                  <a:pt x="868327" y="564716"/>
-                  <a:pt x="1343498" y="474958"/>
-                  <a:pt x="1765173" y="149097"/>
-                </a:cubicBezTo>
-                <a:close/>
-              </a:path>
-            </a:pathLst>
-          </a:custGeom>
-          <a:solidFill>
-            <a:schemeClr val="lt2"/>
-          </a:solidFill>
-          <a:ln>
-            <a:noFill/>
-          </a:ln>
-        </p:spPr>
-        <p:txBody>
-          <a:bodyPr spcFirstLastPara="1" wrap="square" lIns="91425" tIns="45700" rIns="91425" bIns="45700" anchor="ctr" anchorCtr="0">
-            <a:noAutofit/>
-          </a:bodyPr>
-          <a:lstStyle/>
-          <a:p>
-            <a:pPr marL="0" marR="0" lvl="0" indent="0" algn="ctr" defTabSz="914400" rtl="0" eaLnBrk="1" fontAlgn="auto" latinLnBrk="0" hangingPunct="1">
-              <a:lnSpc>
-                <a:spcPct val="100000"/>
-              </a:lnSpc>
-              <a:spcBef>
-                <a:spcPts val="0"/>
-              </a:spcBef>
-              <a:spcAft>
-                <a:spcPts val="0"/>
-              </a:spcAft>
-              <a:buClr>
-                <a:srgbClr val="000000"/>
-              </a:buClr>
-              <a:buSzTx/>
-              <a:buFont typeface="Arial"/>
-              <a:buNone/>
-              <a:tabLst/>
-              <a:defRPr/>
-            </a:pPr>
-            <a:endParaRPr kumimoji="0" sz="1800" b="0" i="0" u="none" strike="noStrike" kern="0" cap="none" spc="0" normalizeH="0" baseline="0" noProof="0">
-              <a:ln>
-                <a:noFill/>
-              </a:ln>
-              <a:solidFill>
-                <a:srgbClr val="FFFFFF"/>
-              </a:solidFill>
-              <a:effectLst/>
-              <a:uLnTx/>
-              <a:uFillTx/>
-              <a:latin typeface="Sorts Mill Goudy"/>
-              <a:ea typeface="Sorts Mill Goudy"/>
-              <a:cs typeface="Sorts Mill Goudy"/>
-              <a:sym typeface="Sorts Mill Goudy"/>
-            </a:endParaRPr>
-          </a:p>
-        </p:txBody>
-      </p:sp>
-      <p:sp>
-        <p:nvSpPr>
-          <p:cNvPr id="102" name="Google Shape;102;p1"/>
+          <p:cNvPr id="298" name="Google Shape;298;p30"/>
           <p:cNvSpPr txBox="1">
             <a:spLocks noGrp="1"/>
           </p:cNvSpPr>
           <p:nvPr>
-            <p:ph type="ctrTitle"/>
+            <p:ph type="title"/>
           </p:nvPr>
         </p:nvSpPr>
         <p:spPr>
           <a:xfrm>
-            <a:off x="1371600" y="1828800"/>
-            <a:ext cx="3356517" cy="1600200"/>
+            <a:off x="838200" y="365125"/>
+            <a:ext cx="10515600" cy="1325563"/>
           </a:xfrm>
           <a:prstGeom prst="rect">
             <a:avLst/>
@@ -31433,14 +30909,14 @@
           </a:ln>
         </p:spPr>
         <p:txBody>
-          <a:bodyPr spcFirstLastPara="1" wrap="square" lIns="91425" tIns="45700" rIns="91425" bIns="45700" anchor="b" anchorCtr="0">
-            <a:noAutofit/>
+          <a:bodyPr spcFirstLastPara="1" wrap="square" lIns="91425" tIns="45700" rIns="91425" bIns="45700" anchor="ctr" anchorCtr="0">
+            <a:normAutofit/>
           </a:bodyPr>
           <a:lstStyle/>
           <a:p>
             <a:pPr marL="0" lvl="0" indent="0" algn="ctr" rtl="0">
               <a:lnSpc>
-                <a:spcPct val="100000"/>
+                <a:spcPct val="90000"/>
               </a:lnSpc>
               <a:spcBef>
                 <a:spcPts val="0"/>
@@ -31449,41 +30925,34 @@
                 <a:spcPts val="0"/>
               </a:spcAft>
               <a:buClr>
-                <a:schemeClr val="dk2"/>
+                <a:schemeClr val="dk1"/>
               </a:buClr>
-              <a:buSzPts val="4000"/>
-              <a:buFont typeface="Sorts Mill Goudy"/>
+              <a:buSzPts val="8800"/>
+              <a:buFont typeface="Calibri"/>
               <a:buNone/>
             </a:pPr>
             <a:r>
-              <a:rPr lang="en-US" sz="4000" b="1" dirty="0"/>
-              <a:t>Data Analytics </a:t>
+              <a:rPr lang="en-US" sz="8800" b="1"/>
+              <a:t>Lists</a:t>
             </a:r>
-            <a:br>
-              <a:rPr lang="en-US" sz="4000" b="1" dirty="0"/>
-            </a:br>
-            <a:r>
-              <a:rPr lang="en-US" sz="4000" b="1" dirty="0"/>
-              <a:t>+ Python</a:t>
-            </a:r>
-            <a:endParaRPr b="1" dirty="0"/>
+            <a:endParaRPr/>
           </a:p>
         </p:txBody>
       </p:sp>
       <p:sp>
         <p:nvSpPr>
-          <p:cNvPr id="103" name="Google Shape;103;p1"/>
+          <p:cNvPr id="299" name="Google Shape;299;p30"/>
           <p:cNvSpPr txBox="1">
             <a:spLocks noGrp="1"/>
           </p:cNvSpPr>
           <p:nvPr>
-            <p:ph type="subTitle" idx="1"/>
+            <p:ph type="body" idx="1"/>
           </p:nvPr>
         </p:nvSpPr>
         <p:spPr>
           <a:xfrm>
-            <a:off x="1594514" y="3813717"/>
-            <a:ext cx="2906973" cy="1331489"/>
+            <a:off x="265043" y="1825625"/>
+            <a:ext cx="11728174" cy="4351338"/>
           </a:xfrm>
           <a:prstGeom prst="rect">
             <a:avLst/>
@@ -31495,183 +30964,13 @@
         </p:spPr>
         <p:txBody>
           <a:bodyPr spcFirstLastPara="1" wrap="square" lIns="91425" tIns="45700" rIns="91425" bIns="45700" anchor="t" anchorCtr="0">
-            <a:normAutofit fontScale="92500" lnSpcReduction="10000"/>
+            <a:normAutofit/>
           </a:bodyPr>
           <a:lstStyle/>
           <a:p>
             <a:pPr marL="0" lvl="0" indent="0" algn="ctr" rtl="0">
               <a:lnSpc>
-                <a:spcPct val="110000"/>
-              </a:lnSpc>
-              <a:spcBef>
-                <a:spcPts val="0"/>
-              </a:spcBef>
-              <a:spcAft>
-                <a:spcPts val="0"/>
-              </a:spcAft>
-              <a:buClr>
-                <a:schemeClr val="dk2"/>
-              </a:buClr>
-              <a:buSzPts val="3000"/>
-              <a:buNone/>
-            </a:pPr>
-            <a:r>
-              <a:rPr lang="en-US" sz="2800" b="1" dirty="0">
-                <a:solidFill>
-                  <a:schemeClr val="accent6">
-                    <a:lumMod val="50000"/>
-                  </a:schemeClr>
-                </a:solidFill>
-              </a:rPr>
-              <a:t>Advanced / compound</a:t>
-            </a:r>
-            <a:br>
-              <a:rPr lang="en-US" sz="2800" b="1" dirty="0">
-                <a:solidFill>
-                  <a:schemeClr val="accent6">
-                    <a:lumMod val="50000"/>
-                  </a:schemeClr>
-                </a:solidFill>
-              </a:rPr>
-            </a:br>
-            <a:r>
-              <a:rPr lang="en-US" sz="2800" b="1" dirty="0">
-                <a:solidFill>
-                  <a:schemeClr val="accent6">
-                    <a:lumMod val="50000"/>
-                  </a:schemeClr>
-                </a:solidFill>
-              </a:rPr>
-              <a:t>Data Types</a:t>
-            </a:r>
-          </a:p>
-        </p:txBody>
-      </p:sp>
-      <p:sp>
-        <p:nvSpPr>
-          <p:cNvPr id="104" name="Google Shape;104;p1"/>
-          <p:cNvSpPr/>
-          <p:nvPr/>
-        </p:nvSpPr>
-        <p:spPr>
-          <a:xfrm>
-            <a:off x="1040828" y="720724"/>
-            <a:ext cx="4014345" cy="5414576"/>
-          </a:xfrm>
-          <a:custGeom>
-            <a:avLst/>
-            <a:gdLst/>
-            <a:ahLst/>
-            <a:cxnLst/>
-            <a:rect l="l" t="t" r="r" b="b"/>
-            <a:pathLst>
-              <a:path w="4282900" h="5795027" extrusionOk="0">
-                <a:moveTo>
-                  <a:pt x="2144960" y="0"/>
-                </a:moveTo>
-                <a:lnTo>
-                  <a:pt x="2332832" y="164715"/>
-                </a:lnTo>
-                <a:cubicBezTo>
-                  <a:pt x="2798675" y="524709"/>
-                  <a:pt x="3323620" y="623869"/>
-                  <a:pt x="3723546" y="855573"/>
-                </a:cubicBezTo>
-                <a:cubicBezTo>
-                  <a:pt x="4108105" y="1124469"/>
-                  <a:pt x="4282900" y="1432851"/>
-                  <a:pt x="4282900" y="2048959"/>
-                </a:cubicBezTo>
-                <a:lnTo>
-                  <a:pt x="4282900" y="2231503"/>
-                </a:lnTo>
-                <a:lnTo>
-                  <a:pt x="4282900" y="2752557"/>
-                </a:lnTo>
-                <a:lnTo>
-                  <a:pt x="4282900" y="3042471"/>
-                </a:lnTo>
-                <a:lnTo>
-                  <a:pt x="4282900" y="3441681"/>
-                </a:lnTo>
-                <a:lnTo>
-                  <a:pt x="4282900" y="3746068"/>
-                </a:lnTo>
-                <a:cubicBezTo>
-                  <a:pt x="4282900" y="4362177"/>
-                  <a:pt x="4108103" y="4670559"/>
-                  <a:pt x="3723546" y="4939455"/>
-                </a:cubicBezTo>
-                <a:cubicBezTo>
-                  <a:pt x="3323617" y="5171158"/>
-                  <a:pt x="2798672" y="5270318"/>
-                  <a:pt x="2332829" y="5630311"/>
-                </a:cubicBezTo>
-                <a:lnTo>
-                  <a:pt x="2137940" y="5795027"/>
-                </a:lnTo>
-                <a:lnTo>
-                  <a:pt x="1950069" y="5630311"/>
-                </a:lnTo>
-                <a:cubicBezTo>
-                  <a:pt x="1484225" y="5270318"/>
-                  <a:pt x="959280" y="5171158"/>
-                  <a:pt x="559353" y="4939455"/>
-                </a:cubicBezTo>
-                <a:cubicBezTo>
-                  <a:pt x="174796" y="4670559"/>
-                  <a:pt x="0" y="4362177"/>
-                  <a:pt x="0" y="3746068"/>
-                </a:cubicBezTo>
-                <a:lnTo>
-                  <a:pt x="0" y="3441681"/>
-                </a:lnTo>
-                <a:lnTo>
-                  <a:pt x="0" y="3042471"/>
-                </a:lnTo>
-                <a:lnTo>
-                  <a:pt x="0" y="2752557"/>
-                </a:lnTo>
-                <a:lnTo>
-                  <a:pt x="0" y="2231503"/>
-                </a:lnTo>
-                <a:lnTo>
-                  <a:pt x="0" y="2048959"/>
-                </a:lnTo>
-                <a:cubicBezTo>
-                  <a:pt x="0" y="1432851"/>
-                  <a:pt x="174797" y="1124469"/>
-                  <a:pt x="559354" y="855573"/>
-                </a:cubicBezTo>
-                <a:cubicBezTo>
-                  <a:pt x="959283" y="623869"/>
-                  <a:pt x="1484227" y="524709"/>
-                  <a:pt x="1950071" y="164715"/>
-                </a:cubicBezTo>
-                <a:close/>
-              </a:path>
-            </a:pathLst>
-          </a:custGeom>
-          <a:noFill/>
-          <a:ln w="25400" cap="rnd" cmpd="sng">
-            <a:solidFill>
-              <a:schemeClr val="lt2"/>
-            </a:solidFill>
-            <a:prstDash val="dot"/>
-            <a:miter lim="800000"/>
-            <a:headEnd type="none" w="sm" len="sm"/>
-            <a:tailEnd type="none" w="sm" len="sm"/>
-          </a:ln>
-        </p:spPr>
-        <p:txBody>
-          <a:bodyPr spcFirstLastPara="1" wrap="square" lIns="91425" tIns="45700" rIns="91425" bIns="45700" anchor="ctr" anchorCtr="0">
-            <a:noAutofit/>
-          </a:bodyPr>
-          <a:lstStyle/>
-          <a:p>
-            <a:pPr marL="0" marR="0" lvl="0" indent="0" algn="ctr" defTabSz="914400" rtl="0" eaLnBrk="1" fontAlgn="auto" latinLnBrk="0" hangingPunct="1">
-              <a:lnSpc>
-                <a:spcPct val="100000"/>
+                <a:spcPct val="90000"/>
               </a:lnSpc>
               <a:spcBef>
                 <a:spcPts val="0"/>
@@ -31682,124 +30981,307 @@
               <a:buClr>
                 <a:srgbClr val="000000"/>
               </a:buClr>
-              <a:buSzTx/>
-              <a:buFont typeface="Arial"/>
-              <a:buNone/>
-              <a:tabLst/>
-              <a:defRPr/>
+              <a:buSzPts val="2800"/>
+              <a:buNone/>
             </a:pPr>
-            <a:endParaRPr kumimoji="0" sz="1800" b="0" i="0" u="none" strike="noStrike" kern="0" cap="none" spc="0" normalizeH="0" baseline="0" noProof="0">
-              <a:ln>
-                <a:noFill/>
-              </a:ln>
+            <a:r>
+              <a:rPr lang="en-US" b="0" i="0">
+                <a:solidFill>
+                  <a:srgbClr val="000000"/>
+                </a:solidFill>
+                <a:latin typeface="Consolas"/>
+                <a:ea typeface="Consolas"/>
+                <a:cs typeface="Consolas"/>
+                <a:sym typeface="Consolas"/>
+              </a:rPr>
+              <a:t>There are 3 other types: tuple, set and dictionary</a:t>
+            </a:r>
+            <a:endParaRPr/>
+          </a:p>
+          <a:p>
+            <a:pPr marL="0" lvl="0" indent="0" algn="ctr" rtl="0">
+              <a:lnSpc>
+                <a:spcPct val="90000"/>
+              </a:lnSpc>
+              <a:spcBef>
+                <a:spcPts val="1000"/>
+              </a:spcBef>
+              <a:spcAft>
+                <a:spcPts val="0"/>
+              </a:spcAft>
+              <a:buClr>
+                <a:srgbClr val="000000"/>
+              </a:buClr>
+              <a:buSzPts val="2800"/>
+              <a:buNone/>
+            </a:pPr>
+            <a:r>
+              <a:rPr lang="en-US">
+                <a:solidFill>
+                  <a:srgbClr val="000000"/>
+                </a:solidFill>
+                <a:latin typeface="Consolas"/>
+                <a:ea typeface="Consolas"/>
+                <a:cs typeface="Consolas"/>
+                <a:sym typeface="Consolas"/>
+              </a:rPr>
+              <a:t>Used to store multiple items inside a variable</a:t>
+            </a:r>
+            <a:endParaRPr/>
+          </a:p>
+          <a:p>
+            <a:pPr marL="0" lvl="0" indent="0" algn="ctr" rtl="0">
+              <a:lnSpc>
+                <a:spcPct val="90000"/>
+              </a:lnSpc>
+              <a:spcBef>
+                <a:spcPts val="1000"/>
+              </a:spcBef>
+              <a:spcAft>
+                <a:spcPts val="0"/>
+              </a:spcAft>
+              <a:buClr>
+                <a:srgbClr val="000000"/>
+              </a:buClr>
+              <a:buSzPts val="2800"/>
+              <a:buNone/>
+            </a:pPr>
+            <a:r>
+              <a:rPr lang="en-US" b="0" i="0">
+                <a:solidFill>
+                  <a:srgbClr val="000000"/>
+                </a:solidFill>
+                <a:latin typeface="Consolas"/>
+                <a:ea typeface="Consolas"/>
+                <a:cs typeface="Consolas"/>
+                <a:sym typeface="Consolas"/>
+              </a:rPr>
+              <a:t>Created always with []</a:t>
+            </a:r>
+            <a:endParaRPr/>
+          </a:p>
+          <a:p>
+            <a:pPr marL="0" lvl="0" indent="0" algn="ctr" rtl="0">
+              <a:lnSpc>
+                <a:spcPct val="90000"/>
+              </a:lnSpc>
+              <a:spcBef>
+                <a:spcPts val="1000"/>
+              </a:spcBef>
+              <a:spcAft>
+                <a:spcPts val="0"/>
+              </a:spcAft>
+              <a:buClr>
+                <a:srgbClr val="000000"/>
+              </a:buClr>
+              <a:buSzPts val="2800"/>
+              <a:buNone/>
+            </a:pPr>
+            <a:r>
+              <a:rPr lang="en-US">
+                <a:solidFill>
+                  <a:srgbClr val="000000"/>
+                </a:solidFill>
+                <a:latin typeface="Consolas"/>
+                <a:ea typeface="Consolas"/>
+                <a:cs typeface="Consolas"/>
+                <a:sym typeface="Consolas"/>
+              </a:rPr>
+              <a:t>There is always a strict order BUT they can be modified</a:t>
+            </a:r>
+            <a:endParaRPr/>
+          </a:p>
+          <a:p>
+            <a:pPr marL="0" lvl="0" indent="0" algn="ctr" rtl="0">
+              <a:lnSpc>
+                <a:spcPct val="90000"/>
+              </a:lnSpc>
+              <a:spcBef>
+                <a:spcPts val="1000"/>
+              </a:spcBef>
+              <a:spcAft>
+                <a:spcPts val="0"/>
+              </a:spcAft>
+              <a:buClr>
+                <a:srgbClr val="000000"/>
+              </a:buClr>
+              <a:buSzPts val="2800"/>
+              <a:buNone/>
+            </a:pPr>
+            <a:r>
+              <a:rPr lang="en-US" b="0" i="0">
+                <a:solidFill>
+                  <a:srgbClr val="000000"/>
+                </a:solidFill>
+                <a:latin typeface="Consolas"/>
+                <a:ea typeface="Consolas"/>
+                <a:cs typeface="Consolas"/>
+                <a:sym typeface="Consolas"/>
+              </a:rPr>
+              <a:t>You CAN have duplicates in a list</a:t>
+            </a:r>
+            <a:endParaRPr/>
+          </a:p>
+          <a:p>
+            <a:pPr marL="0" lvl="0" indent="0" algn="ctr" rtl="0">
+              <a:lnSpc>
+                <a:spcPct val="90000"/>
+              </a:lnSpc>
+              <a:spcBef>
+                <a:spcPts val="1000"/>
+              </a:spcBef>
+              <a:spcAft>
+                <a:spcPts val="0"/>
+              </a:spcAft>
+              <a:buClr>
+                <a:srgbClr val="000000"/>
+              </a:buClr>
+              <a:buSzPts val="2800"/>
+              <a:buNone/>
+            </a:pPr>
+            <a:r>
+              <a:rPr lang="en-US">
+                <a:solidFill>
+                  <a:srgbClr val="000000"/>
+                </a:solidFill>
+                <a:latin typeface="Consolas"/>
+                <a:ea typeface="Consolas"/>
+                <a:cs typeface="Consolas"/>
+                <a:sym typeface="Consolas"/>
+              </a:rPr>
+              <a:t>You can make lists out of any data type</a:t>
+            </a:r>
+            <a:endParaRPr/>
+          </a:p>
+          <a:p>
+            <a:pPr marL="0" lvl="0" indent="0" algn="ctr" rtl="0">
+              <a:lnSpc>
+                <a:spcPct val="90000"/>
+              </a:lnSpc>
+              <a:spcBef>
+                <a:spcPts val="1000"/>
+              </a:spcBef>
+              <a:spcAft>
+                <a:spcPts val="0"/>
+              </a:spcAft>
+              <a:buClr>
+                <a:schemeClr val="dk1"/>
+              </a:buClr>
+              <a:buSzPts val="2800"/>
+              <a:buNone/>
+            </a:pPr>
+            <a:endParaRPr b="0" i="0">
               <a:solidFill>
-                <a:srgbClr val="FFFFFF"/>
+                <a:srgbClr val="000000"/>
               </a:solidFill>
-              <a:effectLst/>
-              <a:uLnTx/>
-              <a:uFillTx/>
-              <a:latin typeface="Sorts Mill Goudy"/>
-              <a:ea typeface="Sorts Mill Goudy"/>
-              <a:cs typeface="Sorts Mill Goudy"/>
-              <a:sym typeface="Sorts Mill Goudy"/>
+              <a:latin typeface="Consolas"/>
+              <a:ea typeface="Consolas"/>
+              <a:cs typeface="Consolas"/>
+              <a:sym typeface="Consolas"/>
             </a:endParaRPr>
           </a:p>
-        </p:txBody>
-      </p:sp>
-      <p:sp>
-        <p:nvSpPr>
-          <p:cNvPr id="2" name="TextBox 1">
-            <a:extLst>
-              <a:ext uri="{FF2B5EF4-FFF2-40B4-BE49-F238E27FC236}">
-                <a16:creationId xmlns:a16="http://schemas.microsoft.com/office/drawing/2014/main" id="{20943488-E9C7-2665-AC4A-B1DBFC894B8D}"/>
-              </a:ext>
-            </a:extLst>
-          </p:cNvPr>
-          <p:cNvSpPr txBox="1"/>
-          <p:nvPr/>
-        </p:nvSpPr>
-        <p:spPr>
-          <a:xfrm>
-            <a:off x="7767144" y="3095253"/>
-            <a:ext cx="2830342" cy="2062103"/>
-          </a:xfrm>
-          <a:prstGeom prst="rect">
-            <a:avLst/>
-          </a:prstGeom>
-          <a:noFill/>
-        </p:spPr>
-        <p:txBody>
-          <a:bodyPr wrap="square" rtlCol="0">
-            <a:spAutoFit/>
-          </a:bodyPr>
-          <a:lstStyle/>
           <a:p>
-            <a:pPr marL="342900" indent="-342900">
+            <a:pPr marL="0" lvl="0" indent="0" algn="ctr" rtl="0">
+              <a:lnSpc>
+                <a:spcPct val="90000"/>
+              </a:lnSpc>
+              <a:spcBef>
+                <a:spcPts val="1000"/>
+              </a:spcBef>
+              <a:spcAft>
+                <a:spcPts val="0"/>
+              </a:spcAft>
               <a:buClr>
-                <a:schemeClr val="bg1"/>
+                <a:srgbClr val="000000"/>
               </a:buClr>
-              <a:buFont typeface="Arial" panose="020B0604020202020204" pitchFamily="34" charset="0"/>
-              <a:buChar char="•"/>
+              <a:buSzPts val="2800"/>
+              <a:buNone/>
             </a:pPr>
             <a:r>
-              <a:rPr lang="en-US" sz="3200" dirty="0">
+              <a:rPr lang="en-US" b="0" i="0">
                 <a:solidFill>
-                  <a:schemeClr val="bg1"/>
+                  <a:srgbClr val="000000"/>
                 </a:solidFill>
+                <a:latin typeface="Consolas"/>
+                <a:ea typeface="Consolas"/>
+                <a:cs typeface="Consolas"/>
+                <a:sym typeface="Consolas"/>
               </a:rPr>
-              <a:t>Lists</a:t>
+              <a:t>thislist = [</a:t>
             </a:r>
-          </a:p>
-          <a:p>
-            <a:pPr marL="342900" indent="-342900">
-              <a:buClr>
-                <a:schemeClr val="bg1"/>
-              </a:buClr>
-              <a:buFont typeface="Arial" panose="020B0604020202020204" pitchFamily="34" charset="0"/>
-              <a:buChar char="•"/>
-            </a:pPr>
             <a:r>
-              <a:rPr lang="en-US" sz="3200" dirty="0">
+              <a:rPr lang="en-US" b="0" i="0">
                 <a:solidFill>
-                  <a:schemeClr val="bg1"/>
+                  <a:srgbClr val="A52A2A"/>
                 </a:solidFill>
+                <a:latin typeface="Consolas"/>
+                <a:ea typeface="Consolas"/>
+                <a:cs typeface="Consolas"/>
+                <a:sym typeface="Consolas"/>
               </a:rPr>
-              <a:t>Tuples</a:t>
+              <a:t>"apple"</a:t>
             </a:r>
-          </a:p>
-          <a:p>
-            <a:pPr marL="342900" indent="-342900">
-              <a:buClr>
-                <a:schemeClr val="bg1"/>
-              </a:buClr>
-              <a:buFont typeface="Arial" panose="020B0604020202020204" pitchFamily="34" charset="0"/>
-              <a:buChar char="•"/>
-            </a:pPr>
             <a:r>
-              <a:rPr lang="en-US" sz="3200" dirty="0">
+              <a:rPr lang="en-US" b="0" i="0">
                 <a:solidFill>
-                  <a:schemeClr val="bg1"/>
+                  <a:srgbClr val="000000"/>
                 </a:solidFill>
+                <a:latin typeface="Consolas"/>
+                <a:ea typeface="Consolas"/>
+                <a:cs typeface="Consolas"/>
+                <a:sym typeface="Consolas"/>
               </a:rPr>
-              <a:t>Sets</a:t>
+              <a:t>, </a:t>
             </a:r>
-          </a:p>
-          <a:p>
-            <a:pPr marL="342900" indent="-342900">
-              <a:buClr>
-                <a:schemeClr val="bg1"/>
-              </a:buClr>
-              <a:buFont typeface="Arial" panose="020B0604020202020204" pitchFamily="34" charset="0"/>
-              <a:buChar char="•"/>
-            </a:pPr>
             <a:r>
-              <a:rPr lang="en-US" sz="3200" dirty="0">
+              <a:rPr lang="en-US" b="0" i="0">
                 <a:solidFill>
-                  <a:schemeClr val="bg1"/>
+                  <a:srgbClr val="A52A2A"/>
                 </a:solidFill>
+                <a:latin typeface="Consolas"/>
+                <a:ea typeface="Consolas"/>
+                <a:cs typeface="Consolas"/>
+                <a:sym typeface="Consolas"/>
               </a:rPr>
-              <a:t>Dictionaries</a:t>
+              <a:t>"banana"</a:t>
             </a:r>
+            <a:r>
+              <a:rPr lang="en-US" b="0" i="0">
+                <a:solidFill>
+                  <a:srgbClr val="000000"/>
+                </a:solidFill>
+                <a:latin typeface="Consolas"/>
+                <a:ea typeface="Consolas"/>
+                <a:cs typeface="Consolas"/>
+                <a:sym typeface="Consolas"/>
+              </a:rPr>
+              <a:t>, </a:t>
+            </a:r>
+            <a:r>
+              <a:rPr lang="en-US" b="0" i="0">
+                <a:solidFill>
+                  <a:srgbClr val="A52A2A"/>
+                </a:solidFill>
+                <a:latin typeface="Consolas"/>
+                <a:ea typeface="Consolas"/>
+                <a:cs typeface="Consolas"/>
+                <a:sym typeface="Consolas"/>
+              </a:rPr>
+              <a:t>"cherry"</a:t>
+            </a:r>
+            <a:r>
+              <a:rPr lang="en-US" b="0" i="0">
+                <a:solidFill>
+                  <a:srgbClr val="000000"/>
+                </a:solidFill>
+                <a:latin typeface="Consolas"/>
+                <a:ea typeface="Consolas"/>
+                <a:cs typeface="Consolas"/>
+                <a:sym typeface="Consolas"/>
+              </a:rPr>
+              <a:t>]</a:t>
+            </a:r>
+            <a:endParaRPr/>
           </a:p>
         </p:txBody>
       </p:sp>
@@ -31808,9 +31290,18 @@
   <p:clrMapOvr>
     <a:masterClrMapping/>
   </p:clrMapOvr>
-  <p:transition spd="slow">
-    <p:wipe/>
-  </p:transition>
+  <mc:AlternateContent xmlns:mc="http://schemas.openxmlformats.org/markup-compatibility/2006" xmlns:p14="http://schemas.microsoft.com/office/powerpoint/2010/main">
+    <mc:Choice Requires="p14">
+      <p:transition spd="slow" p14:dur="1500">
+        <p:split orient="vert"/>
+      </p:transition>
+    </mc:Choice>
+    <mc:Fallback xmlns="">
+      <p:transition spd="slow">
+        <p:split orient="vert"/>
+      </p:transition>
+    </mc:Fallback>
+  </mc:AlternateContent>
   <p:timing>
     <p:tnLst>
       <p:par>
@@ -31823,9 +31314,6 @@
                     <p:cTn id="3" fill="hold">
                       <p:stCondLst>
                         <p:cond delay="indefinite"/>
-                        <p:cond evt="onBegin" delay="0">
-                          <p:tn val="2"/>
-                        </p:cond>
                       </p:stCondLst>
                       <p:childTnLst>
                         <p:par>
@@ -31835,9 +31323,9 @@
                             </p:stCondLst>
                             <p:childTnLst>
                               <p:par>
-                                <p:cTn id="5" presetID="10" presetClass="entr" presetSubtype="0" fill="hold" nodeType="withEffect">
+                                <p:cTn id="5" presetID="2" presetClass="entr" presetSubtype="4" fill="hold" nodeType="clickEffect">
                                   <p:stCondLst>
-                                    <p:cond delay="2000"/>
+                                    <p:cond delay="0"/>
                                   </p:stCondLst>
                                   <p:childTnLst>
                                     <p:set>
@@ -31848,7 +31336,7 @@
                                           </p:stCondLst>
                                         </p:cTn>
                                         <p:tgtEl>
-                                          <p:spTgt spid="103">
+                                          <p:spTgt spid="299">
                                             <p:txEl>
                                               <p:pRg st="0" end="0"/>
                                             </p:txEl>
@@ -31862,36 +31350,73 @@
                                         <p:strVal val="visible"/>
                                       </p:to>
                                     </p:set>
-                                    <p:animEffect transition="in" filter="fade">
-                                      <p:cBhvr>
-                                        <p:cTn id="7" dur="400"/>
+                                    <p:anim calcmode="lin" valueType="num">
+                                      <p:cBhvr additive="base">
+                                        <p:cTn id="7" dur="500"/>
                                         <p:tgtEl>
-                                          <p:spTgt spid="103">
+                                          <p:spTgt spid="299">
                                             <p:txEl>
                                               <p:pRg st="0" end="0"/>
                                             </p:txEl>
                                           </p:spTgt>
                                         </p:tgtEl>
+                                        <p:attrNameLst>
+                                          <p:attrName>ppt_y</p:attrName>
+                                        </p:attrNameLst>
                                       </p:cBhvr>
-                                    </p:animEffect>
+                                      <p:tavLst>
+                                        <p:tav tm="0">
+                                          <p:val>
+                                            <p:strVal val="#ppt_y+1"/>
+                                          </p:val>
+                                        </p:tav>
+                                        <p:tav tm="100000">
+                                          <p:val>
+                                            <p:strVal val="#ppt_y"/>
+                                          </p:val>
+                                        </p:tav>
+                                      </p:tavLst>
+                                    </p:anim>
                                   </p:childTnLst>
                                 </p:cTn>
                               </p:par>
+                            </p:childTnLst>
+                          </p:cTn>
+                        </p:par>
+                      </p:childTnLst>
+                    </p:cTn>
+                  </p:par>
+                  <p:par>
+                    <p:cTn id="8" fill="hold">
+                      <p:stCondLst>
+                        <p:cond delay="indefinite"/>
+                      </p:stCondLst>
+                      <p:childTnLst>
+                        <p:par>
+                          <p:cTn id="9" fill="hold">
+                            <p:stCondLst>
+                              <p:cond delay="0"/>
+                            </p:stCondLst>
+                            <p:childTnLst>
                               <p:par>
-                                <p:cTn id="8" presetID="10" presetClass="entr" presetSubtype="0" fill="hold" nodeType="withEffect">
+                                <p:cTn id="10" presetID="2" presetClass="entr" presetSubtype="4" fill="hold" nodeType="clickEffect">
                                   <p:stCondLst>
-                                    <p:cond delay="1000"/>
+                                    <p:cond delay="0"/>
                                   </p:stCondLst>
                                   <p:childTnLst>
                                     <p:set>
                                       <p:cBhvr>
-                                        <p:cTn id="9" dur="1" fill="hold">
+                                        <p:cTn id="11" dur="1" fill="hold">
                                           <p:stCondLst>
                                             <p:cond delay="0"/>
                                           </p:stCondLst>
                                         </p:cTn>
                                         <p:tgtEl>
-                                          <p:spTgt spid="102"/>
+                                          <p:spTgt spid="299">
+                                            <p:txEl>
+                                              <p:pRg st="1" end="1"/>
+                                            </p:txEl>
+                                          </p:spTgt>
                                         </p:tgtEl>
                                         <p:attrNameLst>
                                           <p:attrName>style.visibility</p:attrName>
@@ -31901,14 +31426,489 @@
                                         <p:strVal val="visible"/>
                                       </p:to>
                                     </p:set>
-                                    <p:animEffect transition="in" filter="fade">
+                                    <p:anim calcmode="lin" valueType="num">
+                                      <p:cBhvr additive="base">
+                                        <p:cTn id="12" dur="500"/>
+                                        <p:tgtEl>
+                                          <p:spTgt spid="299">
+                                            <p:txEl>
+                                              <p:pRg st="1" end="1"/>
+                                            </p:txEl>
+                                          </p:spTgt>
+                                        </p:tgtEl>
+                                        <p:attrNameLst>
+                                          <p:attrName>ppt_y</p:attrName>
+                                        </p:attrNameLst>
+                                      </p:cBhvr>
+                                      <p:tavLst>
+                                        <p:tav tm="0">
+                                          <p:val>
+                                            <p:strVal val="#ppt_y+1"/>
+                                          </p:val>
+                                        </p:tav>
+                                        <p:tav tm="100000">
+                                          <p:val>
+                                            <p:strVal val="#ppt_y"/>
+                                          </p:val>
+                                        </p:tav>
+                                      </p:tavLst>
+                                    </p:anim>
+                                  </p:childTnLst>
+                                </p:cTn>
+                              </p:par>
+                            </p:childTnLst>
+                          </p:cTn>
+                        </p:par>
+                      </p:childTnLst>
+                    </p:cTn>
+                  </p:par>
+                  <p:par>
+                    <p:cTn id="13" fill="hold">
+                      <p:stCondLst>
+                        <p:cond delay="indefinite"/>
+                      </p:stCondLst>
+                      <p:childTnLst>
+                        <p:par>
+                          <p:cTn id="14" fill="hold">
+                            <p:stCondLst>
+                              <p:cond delay="0"/>
+                            </p:stCondLst>
+                            <p:childTnLst>
+                              <p:par>
+                                <p:cTn id="15" presetID="2" presetClass="entr" presetSubtype="4" fill="hold" nodeType="clickEffect">
+                                  <p:stCondLst>
+                                    <p:cond delay="0"/>
+                                  </p:stCondLst>
+                                  <p:childTnLst>
+                                    <p:set>
                                       <p:cBhvr>
-                                        <p:cTn id="10" dur="400"/>
+                                        <p:cTn id="16" dur="1" fill="hold">
+                                          <p:stCondLst>
+                                            <p:cond delay="0"/>
+                                          </p:stCondLst>
+                                        </p:cTn>
                                         <p:tgtEl>
-                                          <p:spTgt spid="102"/>
+                                          <p:spTgt spid="299">
+                                            <p:txEl>
+                                              <p:pRg st="2" end="2"/>
+                                            </p:txEl>
+                                          </p:spTgt>
                                         </p:tgtEl>
+                                        <p:attrNameLst>
+                                          <p:attrName>style.visibility</p:attrName>
+                                        </p:attrNameLst>
                                       </p:cBhvr>
-                                    </p:animEffect>
+                                      <p:to>
+                                        <p:strVal val="visible"/>
+                                      </p:to>
+                                    </p:set>
+                                    <p:anim calcmode="lin" valueType="num">
+                                      <p:cBhvr additive="base">
+                                        <p:cTn id="17" dur="500"/>
+                                        <p:tgtEl>
+                                          <p:spTgt spid="299">
+                                            <p:txEl>
+                                              <p:pRg st="2" end="2"/>
+                                            </p:txEl>
+                                          </p:spTgt>
+                                        </p:tgtEl>
+                                        <p:attrNameLst>
+                                          <p:attrName>ppt_y</p:attrName>
+                                        </p:attrNameLst>
+                                      </p:cBhvr>
+                                      <p:tavLst>
+                                        <p:tav tm="0">
+                                          <p:val>
+                                            <p:strVal val="#ppt_y+1"/>
+                                          </p:val>
+                                        </p:tav>
+                                        <p:tav tm="100000">
+                                          <p:val>
+                                            <p:strVal val="#ppt_y"/>
+                                          </p:val>
+                                        </p:tav>
+                                      </p:tavLst>
+                                    </p:anim>
+                                  </p:childTnLst>
+                                </p:cTn>
+                              </p:par>
+                            </p:childTnLst>
+                          </p:cTn>
+                        </p:par>
+                      </p:childTnLst>
+                    </p:cTn>
+                  </p:par>
+                  <p:par>
+                    <p:cTn id="18" fill="hold">
+                      <p:stCondLst>
+                        <p:cond delay="indefinite"/>
+                      </p:stCondLst>
+                      <p:childTnLst>
+                        <p:par>
+                          <p:cTn id="19" fill="hold">
+                            <p:stCondLst>
+                              <p:cond delay="0"/>
+                            </p:stCondLst>
+                            <p:childTnLst>
+                              <p:par>
+                                <p:cTn id="20" presetID="2" presetClass="entr" presetSubtype="4" fill="hold" nodeType="clickEffect">
+                                  <p:stCondLst>
+                                    <p:cond delay="0"/>
+                                  </p:stCondLst>
+                                  <p:childTnLst>
+                                    <p:set>
+                                      <p:cBhvr>
+                                        <p:cTn id="21" dur="1" fill="hold">
+                                          <p:stCondLst>
+                                            <p:cond delay="0"/>
+                                          </p:stCondLst>
+                                        </p:cTn>
+                                        <p:tgtEl>
+                                          <p:spTgt spid="299">
+                                            <p:txEl>
+                                              <p:pRg st="3" end="3"/>
+                                            </p:txEl>
+                                          </p:spTgt>
+                                        </p:tgtEl>
+                                        <p:attrNameLst>
+                                          <p:attrName>style.visibility</p:attrName>
+                                        </p:attrNameLst>
+                                      </p:cBhvr>
+                                      <p:to>
+                                        <p:strVal val="visible"/>
+                                      </p:to>
+                                    </p:set>
+                                    <p:anim calcmode="lin" valueType="num">
+                                      <p:cBhvr additive="base">
+                                        <p:cTn id="22" dur="500"/>
+                                        <p:tgtEl>
+                                          <p:spTgt spid="299">
+                                            <p:txEl>
+                                              <p:pRg st="3" end="3"/>
+                                            </p:txEl>
+                                          </p:spTgt>
+                                        </p:tgtEl>
+                                        <p:attrNameLst>
+                                          <p:attrName>ppt_y</p:attrName>
+                                        </p:attrNameLst>
+                                      </p:cBhvr>
+                                      <p:tavLst>
+                                        <p:tav tm="0">
+                                          <p:val>
+                                            <p:strVal val="#ppt_y+1"/>
+                                          </p:val>
+                                        </p:tav>
+                                        <p:tav tm="100000">
+                                          <p:val>
+                                            <p:strVal val="#ppt_y"/>
+                                          </p:val>
+                                        </p:tav>
+                                      </p:tavLst>
+                                    </p:anim>
+                                  </p:childTnLst>
+                                </p:cTn>
+                              </p:par>
+                            </p:childTnLst>
+                          </p:cTn>
+                        </p:par>
+                      </p:childTnLst>
+                    </p:cTn>
+                  </p:par>
+                  <p:par>
+                    <p:cTn id="23" fill="hold">
+                      <p:stCondLst>
+                        <p:cond delay="indefinite"/>
+                      </p:stCondLst>
+                      <p:childTnLst>
+                        <p:par>
+                          <p:cTn id="24" fill="hold">
+                            <p:stCondLst>
+                              <p:cond delay="0"/>
+                            </p:stCondLst>
+                            <p:childTnLst>
+                              <p:par>
+                                <p:cTn id="25" presetID="2" presetClass="entr" presetSubtype="4" fill="hold" nodeType="clickEffect">
+                                  <p:stCondLst>
+                                    <p:cond delay="0"/>
+                                  </p:stCondLst>
+                                  <p:childTnLst>
+                                    <p:set>
+                                      <p:cBhvr>
+                                        <p:cTn id="26" dur="1" fill="hold">
+                                          <p:stCondLst>
+                                            <p:cond delay="0"/>
+                                          </p:stCondLst>
+                                        </p:cTn>
+                                        <p:tgtEl>
+                                          <p:spTgt spid="299">
+                                            <p:txEl>
+                                              <p:pRg st="4" end="4"/>
+                                            </p:txEl>
+                                          </p:spTgt>
+                                        </p:tgtEl>
+                                        <p:attrNameLst>
+                                          <p:attrName>style.visibility</p:attrName>
+                                        </p:attrNameLst>
+                                      </p:cBhvr>
+                                      <p:to>
+                                        <p:strVal val="visible"/>
+                                      </p:to>
+                                    </p:set>
+                                    <p:anim calcmode="lin" valueType="num">
+                                      <p:cBhvr additive="base">
+                                        <p:cTn id="27" dur="500"/>
+                                        <p:tgtEl>
+                                          <p:spTgt spid="299">
+                                            <p:txEl>
+                                              <p:pRg st="4" end="4"/>
+                                            </p:txEl>
+                                          </p:spTgt>
+                                        </p:tgtEl>
+                                        <p:attrNameLst>
+                                          <p:attrName>ppt_y</p:attrName>
+                                        </p:attrNameLst>
+                                      </p:cBhvr>
+                                      <p:tavLst>
+                                        <p:tav tm="0">
+                                          <p:val>
+                                            <p:strVal val="#ppt_y+1"/>
+                                          </p:val>
+                                        </p:tav>
+                                        <p:tav tm="100000">
+                                          <p:val>
+                                            <p:strVal val="#ppt_y"/>
+                                          </p:val>
+                                        </p:tav>
+                                      </p:tavLst>
+                                    </p:anim>
+                                  </p:childTnLst>
+                                </p:cTn>
+                              </p:par>
+                            </p:childTnLst>
+                          </p:cTn>
+                        </p:par>
+                      </p:childTnLst>
+                    </p:cTn>
+                  </p:par>
+                  <p:par>
+                    <p:cTn id="28" fill="hold">
+                      <p:stCondLst>
+                        <p:cond delay="indefinite"/>
+                      </p:stCondLst>
+                      <p:childTnLst>
+                        <p:par>
+                          <p:cTn id="29" fill="hold">
+                            <p:stCondLst>
+                              <p:cond delay="0"/>
+                            </p:stCondLst>
+                            <p:childTnLst>
+                              <p:par>
+                                <p:cTn id="30" presetID="2" presetClass="entr" presetSubtype="4" fill="hold" nodeType="clickEffect">
+                                  <p:stCondLst>
+                                    <p:cond delay="0"/>
+                                  </p:stCondLst>
+                                  <p:childTnLst>
+                                    <p:set>
+                                      <p:cBhvr>
+                                        <p:cTn id="31" dur="1" fill="hold">
+                                          <p:stCondLst>
+                                            <p:cond delay="0"/>
+                                          </p:stCondLst>
+                                        </p:cTn>
+                                        <p:tgtEl>
+                                          <p:spTgt spid="299">
+                                            <p:txEl>
+                                              <p:pRg st="5" end="5"/>
+                                            </p:txEl>
+                                          </p:spTgt>
+                                        </p:tgtEl>
+                                        <p:attrNameLst>
+                                          <p:attrName>style.visibility</p:attrName>
+                                        </p:attrNameLst>
+                                      </p:cBhvr>
+                                      <p:to>
+                                        <p:strVal val="visible"/>
+                                      </p:to>
+                                    </p:set>
+                                    <p:anim calcmode="lin" valueType="num">
+                                      <p:cBhvr additive="base">
+                                        <p:cTn id="32" dur="500"/>
+                                        <p:tgtEl>
+                                          <p:spTgt spid="299">
+                                            <p:txEl>
+                                              <p:pRg st="5" end="5"/>
+                                            </p:txEl>
+                                          </p:spTgt>
+                                        </p:tgtEl>
+                                        <p:attrNameLst>
+                                          <p:attrName>ppt_y</p:attrName>
+                                        </p:attrNameLst>
+                                      </p:cBhvr>
+                                      <p:tavLst>
+                                        <p:tav tm="0">
+                                          <p:val>
+                                            <p:strVal val="#ppt_y+1"/>
+                                          </p:val>
+                                        </p:tav>
+                                        <p:tav tm="100000">
+                                          <p:val>
+                                            <p:strVal val="#ppt_y"/>
+                                          </p:val>
+                                        </p:tav>
+                                      </p:tavLst>
+                                    </p:anim>
+                                  </p:childTnLst>
+                                </p:cTn>
+                              </p:par>
+                            </p:childTnLst>
+                          </p:cTn>
+                        </p:par>
+                      </p:childTnLst>
+                    </p:cTn>
+                  </p:par>
+                  <p:par>
+                    <p:cTn id="33" fill="hold">
+                      <p:stCondLst>
+                        <p:cond delay="indefinite"/>
+                      </p:stCondLst>
+                      <p:childTnLst>
+                        <p:par>
+                          <p:cTn id="34" fill="hold">
+                            <p:stCondLst>
+                              <p:cond delay="0"/>
+                            </p:stCondLst>
+                            <p:childTnLst>
+                              <p:par>
+                                <p:cTn id="35" presetID="2" presetClass="entr" presetSubtype="4" fill="hold" nodeType="clickEffect">
+                                  <p:stCondLst>
+                                    <p:cond delay="0"/>
+                                  </p:stCondLst>
+                                  <p:childTnLst>
+                                    <p:set>
+                                      <p:cBhvr>
+                                        <p:cTn id="36" dur="1" fill="hold">
+                                          <p:stCondLst>
+                                            <p:cond delay="0"/>
+                                          </p:stCondLst>
+                                        </p:cTn>
+                                        <p:tgtEl>
+                                          <p:spTgt spid="299">
+                                            <p:txEl>
+                                              <p:pRg st="6" end="6"/>
+                                            </p:txEl>
+                                          </p:spTgt>
+                                        </p:tgtEl>
+                                        <p:attrNameLst>
+                                          <p:attrName>style.visibility</p:attrName>
+                                        </p:attrNameLst>
+                                      </p:cBhvr>
+                                      <p:to>
+                                        <p:strVal val="visible"/>
+                                      </p:to>
+                                    </p:set>
+                                    <p:anim calcmode="lin" valueType="num">
+                                      <p:cBhvr additive="base">
+                                        <p:cTn id="37" dur="500"/>
+                                        <p:tgtEl>
+                                          <p:spTgt spid="299">
+                                            <p:txEl>
+                                              <p:pRg st="6" end="6"/>
+                                            </p:txEl>
+                                          </p:spTgt>
+                                        </p:tgtEl>
+                                        <p:attrNameLst>
+                                          <p:attrName>ppt_y</p:attrName>
+                                        </p:attrNameLst>
+                                      </p:cBhvr>
+                                      <p:tavLst>
+                                        <p:tav tm="0">
+                                          <p:val>
+                                            <p:strVal val="#ppt_y+1"/>
+                                          </p:val>
+                                        </p:tav>
+                                        <p:tav tm="100000">
+                                          <p:val>
+                                            <p:strVal val="#ppt_y"/>
+                                          </p:val>
+                                        </p:tav>
+                                      </p:tavLst>
+                                    </p:anim>
+                                  </p:childTnLst>
+                                </p:cTn>
+                              </p:par>
+                            </p:childTnLst>
+                          </p:cTn>
+                        </p:par>
+                      </p:childTnLst>
+                    </p:cTn>
+                  </p:par>
+                  <p:par>
+                    <p:cTn id="38" fill="hold">
+                      <p:stCondLst>
+                        <p:cond delay="indefinite"/>
+                      </p:stCondLst>
+                      <p:childTnLst>
+                        <p:par>
+                          <p:cTn id="39" fill="hold">
+                            <p:stCondLst>
+                              <p:cond delay="0"/>
+                            </p:stCondLst>
+                            <p:childTnLst>
+                              <p:par>
+                                <p:cTn id="40" presetID="2" presetClass="entr" presetSubtype="4" fill="hold" nodeType="clickEffect">
+                                  <p:stCondLst>
+                                    <p:cond delay="0"/>
+                                  </p:stCondLst>
+                                  <p:childTnLst>
+                                    <p:set>
+                                      <p:cBhvr>
+                                        <p:cTn id="41" dur="1" fill="hold">
+                                          <p:stCondLst>
+                                            <p:cond delay="0"/>
+                                          </p:stCondLst>
+                                        </p:cTn>
+                                        <p:tgtEl>
+                                          <p:spTgt spid="299">
+                                            <p:txEl>
+                                              <p:pRg st="7" end="7"/>
+                                            </p:txEl>
+                                          </p:spTgt>
+                                        </p:tgtEl>
+                                        <p:attrNameLst>
+                                          <p:attrName>style.visibility</p:attrName>
+                                        </p:attrNameLst>
+                                      </p:cBhvr>
+                                      <p:to>
+                                        <p:strVal val="visible"/>
+                                      </p:to>
+                                    </p:set>
+                                    <p:anim calcmode="lin" valueType="num">
+                                      <p:cBhvr additive="base">
+                                        <p:cTn id="42" dur="500"/>
+                                        <p:tgtEl>
+                                          <p:spTgt spid="299">
+                                            <p:txEl>
+                                              <p:pRg st="7" end="7"/>
+                                            </p:txEl>
+                                          </p:spTgt>
+                                        </p:tgtEl>
+                                        <p:attrNameLst>
+                                          <p:attrName>ppt_y</p:attrName>
+                                        </p:attrNameLst>
+                                      </p:cBhvr>
+                                      <p:tavLst>
+                                        <p:tav tm="0">
+                                          <p:val>
+                                            <p:strVal val="#ppt_y+1"/>
+                                          </p:val>
+                                        </p:tav>
+                                        <p:tav tm="100000">
+                                          <p:val>
+                                            <p:strVal val="#ppt_y"/>
+                                          </p:val>
+                                        </p:tav>
+                                      </p:tavLst>
+                                    </p:anim>
                                   </p:childTnLst>
                                 </p:cTn>
                               </p:par>

</xml_diff>